<commit_message>
Look at the presentation
David: you need to add a few slides
</commit_message>
<xml_diff>
--- a/MobAppFinalPresent.pptx
+++ b/MobAppFinalPresent.pptx
@@ -5,22 +5,25 @@
     <p:sldMasterId id="2147483672" r:id="rId1"/>
   </p:sldMasterIdLst>
   <p:notesMasterIdLst>
-    <p:notesMasterId r:id="rId15"/>
+    <p:notesMasterId r:id="rId18"/>
   </p:notesMasterIdLst>
   <p:sldIdLst>
     <p:sldId id="256" r:id="rId2"/>
     <p:sldId id="258" r:id="rId3"/>
     <p:sldId id="267" r:id="rId4"/>
     <p:sldId id="277" r:id="rId5"/>
-    <p:sldId id="274" r:id="rId6"/>
-    <p:sldId id="259" r:id="rId7"/>
-    <p:sldId id="278" r:id="rId8"/>
-    <p:sldId id="279" r:id="rId9"/>
-    <p:sldId id="280" r:id="rId10"/>
-    <p:sldId id="281" r:id="rId11"/>
-    <p:sldId id="273" r:id="rId12"/>
-    <p:sldId id="275" r:id="rId13"/>
-    <p:sldId id="276" r:id="rId14"/>
+    <p:sldId id="282" r:id="rId6"/>
+    <p:sldId id="274" r:id="rId7"/>
+    <p:sldId id="259" r:id="rId8"/>
+    <p:sldId id="283" r:id="rId9"/>
+    <p:sldId id="284" r:id="rId10"/>
+    <p:sldId id="278" r:id="rId11"/>
+    <p:sldId id="285" r:id="rId12"/>
+    <p:sldId id="287" r:id="rId13"/>
+    <p:sldId id="286" r:id="rId14"/>
+    <p:sldId id="279" r:id="rId15"/>
+    <p:sldId id="275" r:id="rId16"/>
+    <p:sldId id="276" r:id="rId17"/>
   </p:sldIdLst>
   <p:sldSz cx="9144000" cy="6858000" type="screen4x3"/>
   <p:notesSz cx="6858000" cy="9144000"/>
@@ -534,14 +537,6 @@
           <a:bodyPr/>
           <a:lstStyle/>
           <a:p>
-            <a:r>
-              <a:rPr lang="en-US" dirty="0" smtClean="0"/>
-              <a:t>For ergonomics</a:t>
-            </a:r>
-            <a:r>
-              <a:rPr lang="en-US" baseline="0" dirty="0" smtClean="0"/>
-              <a:t>, we talked with the business with the suggestion that there doesn’t need to be a +/- button for dice rolls nor a Submit button. </a:t>
-            </a:r>
             <a:endParaRPr lang="en-US" dirty="0"/>
           </a:p>
         </p:txBody>
@@ -564,7 +559,7 @@
             <a:fld id="{9C75C2C6-49ED-4485-B0BC-FAD6842E771D}" type="slidenum">
               <a:rPr lang="en-US" smtClean="0"/>
               <a:pPr/>
-              <a:t>6</a:t>
+              <a:t>7</a:t>
             </a:fld>
             <a:endParaRPr lang="en-US"/>
           </a:p>
@@ -627,14 +622,6 @@
           <a:bodyPr/>
           <a:lstStyle/>
           <a:p>
-            <a:r>
-              <a:rPr lang="en-US" dirty="0" smtClean="0"/>
-              <a:t>For ergonomics</a:t>
-            </a:r>
-            <a:r>
-              <a:rPr lang="en-US" baseline="0" dirty="0" smtClean="0"/>
-              <a:t>, we talked with the business with the suggestion that there doesn’t need to be a +/- button for dice rolls nor a Submit button. </a:t>
-            </a:r>
             <a:endParaRPr lang="en-US" dirty="0"/>
           </a:p>
         </p:txBody>
@@ -657,7 +644,7 @@
             <a:fld id="{9C75C2C6-49ED-4485-B0BC-FAD6842E771D}" type="slidenum">
               <a:rPr lang="en-US" smtClean="0"/>
               <a:pPr/>
-              <a:t>7</a:t>
+              <a:t>10</a:t>
             </a:fld>
             <a:endParaRPr lang="en-US"/>
           </a:p>
@@ -750,193 +737,7 @@
             <a:fld id="{9C75C2C6-49ED-4485-B0BC-FAD6842E771D}" type="slidenum">
               <a:rPr lang="en-US" smtClean="0"/>
               <a:pPr/>
-              <a:t>8</a:t>
-            </a:fld>
-            <a:endParaRPr lang="en-US"/>
-          </a:p>
-        </p:txBody>
-      </p:sp>
-    </p:spTree>
-    <p:extLst>
-      <p:ext uri="{BB962C8B-B14F-4D97-AF65-F5344CB8AC3E}">
-        <p14:creationId xmlns:p14="http://schemas.microsoft.com/office/powerpoint/2010/main" val="3281679178"/>
-      </p:ext>
-    </p:extLst>
-  </p:cSld>
-  <p:clrMapOvr>
-    <a:masterClrMapping/>
-  </p:clrMapOvr>
-</p:notes>
-</file>
-
-<file path=ppt/notesSlides/notesSlide4.xml><?xml version="1.0" encoding="utf-8"?>
-<p:notes xmlns:a="http://schemas.openxmlformats.org/drawingml/2006/main" xmlns:r="http://schemas.openxmlformats.org/officeDocument/2006/relationships" xmlns:p="http://schemas.openxmlformats.org/presentationml/2006/main">
-  <p:cSld>
-    <p:spTree>
-      <p:nvGrpSpPr>
-        <p:cNvPr id="1" name=""/>
-        <p:cNvGrpSpPr/>
-        <p:nvPr/>
-      </p:nvGrpSpPr>
-      <p:grpSpPr>
-        <a:xfrm>
-          <a:off x="0" y="0"/>
-          <a:ext cx="0" cy="0"/>
-          <a:chOff x="0" y="0"/>
-          <a:chExt cx="0" cy="0"/>
-        </a:xfrm>
-      </p:grpSpPr>
-      <p:sp>
-        <p:nvSpPr>
-          <p:cNvPr id="2" name="Slide Image Placeholder 1"/>
-          <p:cNvSpPr>
-            <a:spLocks noGrp="1" noRot="1" noChangeAspect="1"/>
-          </p:cNvSpPr>
-          <p:nvPr>
-            <p:ph type="sldImg"/>
-          </p:nvPr>
-        </p:nvSpPr>
-        <p:spPr/>
-      </p:sp>
-      <p:sp>
-        <p:nvSpPr>
-          <p:cNvPr id="3" name="Notes Placeholder 2"/>
-          <p:cNvSpPr>
-            <a:spLocks noGrp="1"/>
-          </p:cNvSpPr>
-          <p:nvPr>
-            <p:ph type="body" idx="1"/>
-          </p:nvPr>
-        </p:nvSpPr>
-        <p:spPr/>
-        <p:txBody>
-          <a:bodyPr/>
-          <a:lstStyle/>
-          <a:p>
-            <a:r>
-              <a:rPr lang="en-US" dirty="0" smtClean="0"/>
-              <a:t>For ergonomics</a:t>
-            </a:r>
-            <a:r>
-              <a:rPr lang="en-US" baseline="0" dirty="0" smtClean="0"/>
-              <a:t>, we talked with the business with the suggestion that there doesn’t need to be a +/- button for dice rolls nor a Submit button. </a:t>
-            </a:r>
-            <a:endParaRPr lang="en-US" dirty="0"/>
-          </a:p>
-        </p:txBody>
-      </p:sp>
-      <p:sp>
-        <p:nvSpPr>
-          <p:cNvPr id="4" name="Slide Number Placeholder 3"/>
-          <p:cNvSpPr>
-            <a:spLocks noGrp="1"/>
-          </p:cNvSpPr>
-          <p:nvPr>
-            <p:ph type="sldNum" sz="quarter" idx="10"/>
-          </p:nvPr>
-        </p:nvSpPr>
-        <p:spPr/>
-        <p:txBody>
-          <a:bodyPr/>
-          <a:lstStyle/>
-          <a:p>
-            <a:fld id="{9C75C2C6-49ED-4485-B0BC-FAD6842E771D}" type="slidenum">
-              <a:rPr lang="en-US" smtClean="0"/>
-              <a:pPr/>
-              <a:t>9</a:t>
-            </a:fld>
-            <a:endParaRPr lang="en-US"/>
-          </a:p>
-        </p:txBody>
-      </p:sp>
-    </p:spTree>
-    <p:extLst>
-      <p:ext uri="{BB962C8B-B14F-4D97-AF65-F5344CB8AC3E}">
-        <p14:creationId xmlns:p14="http://schemas.microsoft.com/office/powerpoint/2010/main" val="3281679178"/>
-      </p:ext>
-    </p:extLst>
-  </p:cSld>
-  <p:clrMapOvr>
-    <a:masterClrMapping/>
-  </p:clrMapOvr>
-</p:notes>
-</file>
-
-<file path=ppt/notesSlides/notesSlide5.xml><?xml version="1.0" encoding="utf-8"?>
-<p:notes xmlns:a="http://schemas.openxmlformats.org/drawingml/2006/main" xmlns:r="http://schemas.openxmlformats.org/officeDocument/2006/relationships" xmlns:p="http://schemas.openxmlformats.org/presentationml/2006/main">
-  <p:cSld>
-    <p:spTree>
-      <p:nvGrpSpPr>
-        <p:cNvPr id="1" name=""/>
-        <p:cNvGrpSpPr/>
-        <p:nvPr/>
-      </p:nvGrpSpPr>
-      <p:grpSpPr>
-        <a:xfrm>
-          <a:off x="0" y="0"/>
-          <a:ext cx="0" cy="0"/>
-          <a:chOff x="0" y="0"/>
-          <a:chExt cx="0" cy="0"/>
-        </a:xfrm>
-      </p:grpSpPr>
-      <p:sp>
-        <p:nvSpPr>
-          <p:cNvPr id="2" name="Slide Image Placeholder 1"/>
-          <p:cNvSpPr>
-            <a:spLocks noGrp="1" noRot="1" noChangeAspect="1"/>
-          </p:cNvSpPr>
-          <p:nvPr>
-            <p:ph type="sldImg"/>
-          </p:nvPr>
-        </p:nvSpPr>
-        <p:spPr/>
-      </p:sp>
-      <p:sp>
-        <p:nvSpPr>
-          <p:cNvPr id="3" name="Notes Placeholder 2"/>
-          <p:cNvSpPr>
-            <a:spLocks noGrp="1"/>
-          </p:cNvSpPr>
-          <p:nvPr>
-            <p:ph type="body" idx="1"/>
-          </p:nvPr>
-        </p:nvSpPr>
-        <p:spPr/>
-        <p:txBody>
-          <a:bodyPr/>
-          <a:lstStyle/>
-          <a:p>
-            <a:r>
-              <a:rPr lang="en-US" dirty="0" smtClean="0"/>
-              <a:t>For ergonomics</a:t>
-            </a:r>
-            <a:r>
-              <a:rPr lang="en-US" baseline="0" dirty="0" smtClean="0"/>
-              <a:t>, we talked with the business with the suggestion that there doesn’t need to be a +/- button for dice rolls nor a Submit button. </a:t>
-            </a:r>
-            <a:endParaRPr lang="en-US" dirty="0"/>
-          </a:p>
-        </p:txBody>
-      </p:sp>
-      <p:sp>
-        <p:nvSpPr>
-          <p:cNvPr id="4" name="Slide Number Placeholder 3"/>
-          <p:cNvSpPr>
-            <a:spLocks noGrp="1"/>
-          </p:cNvSpPr>
-          <p:nvPr>
-            <p:ph type="sldNum" sz="quarter" idx="10"/>
-          </p:nvPr>
-        </p:nvSpPr>
-        <p:spPr/>
-        <p:txBody>
-          <a:bodyPr/>
-          <a:lstStyle/>
-          <a:p>
-            <a:fld id="{9C75C2C6-49ED-4485-B0BC-FAD6842E771D}" type="slidenum">
-              <a:rPr lang="en-US" smtClean="0"/>
-              <a:pPr/>
-              <a:t>10</a:t>
+              <a:t>14</a:t>
             </a:fld>
             <a:endParaRPr lang="en-US"/>
           </a:p>
@@ -7037,7 +6838,7 @@
         </p:nvSpPr>
         <p:spPr>
           <a:xfrm>
-            <a:off x="744955" y="609600"/>
+            <a:off x="111229" y="562440"/>
             <a:ext cx="7765322" cy="970450"/>
           </a:xfrm>
         </p:spPr>
@@ -7049,7 +6850,7 @@
           <a:p>
             <a:r>
               <a:rPr lang="en-US" b="1" dirty="0" smtClean="0"/>
-              <a:t>UC: </a:t>
+              <a:t>UC:5,6,9</a:t>
             </a:r>
             <a:endParaRPr lang="en-US" b="1" dirty="0"/>
           </a:p>
@@ -7098,7 +6899,7 @@
         <p:spPr>
           <a:xfrm>
             <a:off x="228601" y="1935480"/>
-            <a:ext cx="4800600" cy="754053"/>
+            <a:ext cx="4800600" cy="1954381"/>
           </a:xfrm>
           <a:prstGeom prst="rect">
             <a:avLst/>
@@ -7126,7 +6927,7 @@
               <a:buChar char=""/>
             </a:pPr>
             <a:r>
-              <a:rPr lang="en-US" sz="2000" dirty="0">
+              <a:rPr lang="en-US" sz="2000" dirty="0" smtClean="0">
                 <a:ln>
                   <a:solidFill>
                     <a:schemeClr val="bg1">
@@ -7147,8 +6948,128 @@
                   </a:outerShdw>
                 </a:effectLst>
               </a:rPr>
-              <a:t>At </a:t>
-            </a:r>
+              <a:t>UC:5,6 Employee could manually clock in/out from the app at lunch time </a:t>
+            </a:r>
+          </a:p>
+          <a:p>
+            <a:pPr marL="342900" indent="-306000" defTabSz="457200">
+              <a:spcBef>
+                <a:spcPct val="20000"/>
+              </a:spcBef>
+              <a:spcAft>
+                <a:spcPts val="600"/>
+              </a:spcAft>
+              <a:buClr>
+                <a:schemeClr val="tx2"/>
+              </a:buClr>
+              <a:buSzPct val="70000"/>
+              <a:buFont typeface="Wingdings 2" charset="2"/>
+              <a:buChar char=""/>
+            </a:pPr>
+            <a:r>
+              <a:rPr lang="en-US" sz="2000" dirty="0" smtClean="0">
+                <a:ln>
+                  <a:solidFill>
+                    <a:schemeClr val="bg1">
+                      <a:lumMod val="75000"/>
+                      <a:lumOff val="25000"/>
+                      <a:alpha val="10000"/>
+                    </a:schemeClr>
+                  </a:solidFill>
+                </a:ln>
+                <a:solidFill>
+                  <a:schemeClr val="tx2"/>
+                </a:solidFill>
+                <a:effectLst>
+                  <a:outerShdw blurRad="9525" dist="25400" dir="14640000" algn="tl" rotWithShape="0">
+                    <a:schemeClr val="bg1">
+                      <a:alpha val="30000"/>
+                    </a:schemeClr>
+                  </a:outerShdw>
+                </a:effectLst>
+              </a:rPr>
+              <a:t>UC:9 Employee alerted of time stamp </a:t>
+            </a:r>
+            <a:endParaRPr lang="en-US" sz="2000" dirty="0" smtClean="0">
+              <a:ln>
+                <a:solidFill>
+                  <a:schemeClr val="bg1">
+                    <a:lumMod val="75000"/>
+                    <a:lumOff val="25000"/>
+                    <a:alpha val="10000"/>
+                  </a:schemeClr>
+                </a:solidFill>
+              </a:ln>
+              <a:solidFill>
+                <a:schemeClr val="tx2"/>
+              </a:solidFill>
+              <a:effectLst>
+                <a:outerShdw blurRad="9525" dist="25400" dir="14640000" algn="tl" rotWithShape="0">
+                  <a:schemeClr val="bg1">
+                    <a:alpha val="30000"/>
+                  </a:schemeClr>
+                </a:outerShdw>
+              </a:effectLst>
+            </a:endParaRPr>
+          </a:p>
+          <a:p>
+            <a:pPr marL="36900" defTabSz="457200">
+              <a:spcBef>
+                <a:spcPct val="20000"/>
+              </a:spcBef>
+              <a:spcAft>
+                <a:spcPts val="600"/>
+              </a:spcAft>
+              <a:buClr>
+                <a:schemeClr val="tx2"/>
+              </a:buClr>
+              <a:buSzPct val="70000"/>
+            </a:pPr>
+            <a:r>
+              <a:rPr lang="en-US" sz="2000" dirty="0" smtClean="0">
+                <a:ln>
+                  <a:solidFill>
+                    <a:schemeClr val="bg1">
+                      <a:lumMod val="75000"/>
+                      <a:lumOff val="25000"/>
+                      <a:alpha val="10000"/>
+                    </a:schemeClr>
+                  </a:solidFill>
+                </a:ln>
+                <a:solidFill>
+                  <a:schemeClr val="tx2"/>
+                </a:solidFill>
+                <a:effectLst>
+                  <a:outerShdw blurRad="9525" dist="25400" dir="14640000" algn="tl" rotWithShape="0">
+                    <a:schemeClr val="bg1">
+                      <a:alpha val="30000"/>
+                    </a:schemeClr>
+                  </a:outerShdw>
+                </a:effectLst>
+              </a:rPr>
+              <a:t>Using: Database connection</a:t>
+            </a:r>
+            <a:endParaRPr lang="en-US" sz="2000" dirty="0">
+              <a:ln>
+                <a:solidFill>
+                  <a:schemeClr val="bg1">
+                    <a:lumMod val="75000"/>
+                    <a:lumOff val="25000"/>
+                    <a:alpha val="10000"/>
+                  </a:schemeClr>
+                </a:solidFill>
+              </a:ln>
+              <a:solidFill>
+                <a:schemeClr val="tx2"/>
+              </a:solidFill>
+              <a:effectLst>
+                <a:outerShdw blurRad="9525" dist="25400" dir="14640000" algn="tl" rotWithShape="0">
+                  <a:schemeClr val="bg1">
+                    <a:alpha val="30000"/>
+                  </a:schemeClr>
+                </a:outerShdw>
+              </a:effectLst>
+            </a:endParaRPr>
           </a:p>
           <a:p>
             <a:pPr marL="285750" indent="-285750">
@@ -7159,65 +7080,170 @@
           </a:p>
         </p:txBody>
       </p:sp>
-      <p:sp>
-        <p:nvSpPr>
-          <p:cNvPr id="8" name="TextBox 7"/>
-          <p:cNvSpPr txBox="1"/>
-          <p:nvPr/>
-        </p:nvSpPr>
-        <p:spPr>
-          <a:xfrm>
-            <a:off x="5714999" y="6275697"/>
-            <a:ext cx="2828925" cy="646331"/>
-          </a:xfrm>
-          <a:prstGeom prst="rect">
-            <a:avLst/>
-          </a:prstGeom>
-          <a:noFill/>
-        </p:spPr>
-        <p:txBody>
-          <a:bodyPr wrap="square" rtlCol="0">
-            <a:spAutoFit/>
-          </a:bodyPr>
-          <a:lstStyle/>
-          <a:p>
-            <a:pPr algn="ctr"/>
-            <a:r>
-              <a:rPr lang="en-US" dirty="0" smtClean="0"/>
-              <a:t>Current Android version shown</a:t>
-            </a:r>
-            <a:endParaRPr lang="en-US" dirty="0"/>
-          </a:p>
-        </p:txBody>
-      </p:sp>
       <p:pic>
         <p:nvPicPr>
-          <p:cNvPr id="6" name="Picture 5"/>
+          <p:cNvPr id="7" name="Picture 6" descr="Screen Clipping"/>
           <p:cNvPicPr>
             <a:picLocks noChangeAspect="1"/>
           </p:cNvPicPr>
           <p:nvPr/>
         </p:nvPicPr>
         <p:blipFill>
-          <a:blip r:embed="rId3"/>
+          <a:blip r:embed="rId3">
+            <a:extLst>
+              <a:ext uri="{28A0092B-C50C-407E-A947-70E740481C1C}">
+                <a14:useLocalDpi xmlns:a14="http://schemas.microsoft.com/office/drawing/2010/main" val="0"/>
+              </a:ext>
+            </a:extLst>
+          </a:blip>
           <a:stretch>
             <a:fillRect/>
           </a:stretch>
         </p:blipFill>
         <p:spPr>
           <a:xfrm>
-            <a:off x="5957577" y="2160897"/>
-            <a:ext cx="2552700" cy="4114800"/>
+            <a:off x="2762640" y="4191000"/>
+            <a:ext cx="2266561" cy="3731412"/>
           </a:xfrm>
           <a:prstGeom prst="rect">
             <a:avLst/>
           </a:prstGeom>
         </p:spPr>
       </p:pic>
+      <p:pic>
+        <p:nvPicPr>
+          <p:cNvPr id="9" name="Picture 8" descr="Screen Clipping"/>
+          <p:cNvPicPr>
+            <a:picLocks noChangeAspect="1"/>
+          </p:cNvPicPr>
+          <p:nvPr/>
+        </p:nvPicPr>
+        <p:blipFill>
+          <a:blip r:embed="rId4">
+            <a:extLst>
+              <a:ext uri="{28A0092B-C50C-407E-A947-70E740481C1C}">
+                <a14:useLocalDpi xmlns:a14="http://schemas.microsoft.com/office/drawing/2010/main" val="0"/>
+              </a:ext>
+            </a:extLst>
+          </a:blip>
+          <a:stretch>
+            <a:fillRect/>
+          </a:stretch>
+        </p:blipFill>
+        <p:spPr>
+          <a:xfrm>
+            <a:off x="5773330" y="249049"/>
+            <a:ext cx="2500258" cy="3034082"/>
+          </a:xfrm>
+          <a:prstGeom prst="rect">
+            <a:avLst/>
+          </a:prstGeom>
+        </p:spPr>
+      </p:pic>
+      <p:pic>
+        <p:nvPicPr>
+          <p:cNvPr id="10" name="Picture 9" descr="Screen Clipping"/>
+          <p:cNvPicPr>
+            <a:picLocks noChangeAspect="1"/>
+          </p:cNvPicPr>
+          <p:nvPr/>
+        </p:nvPicPr>
+        <p:blipFill>
+          <a:blip r:embed="rId5">
+            <a:extLst>
+              <a:ext uri="{28A0092B-C50C-407E-A947-70E740481C1C}">
+                <a14:useLocalDpi xmlns:a14="http://schemas.microsoft.com/office/drawing/2010/main" val="0"/>
+              </a:ext>
+            </a:extLst>
+          </a:blip>
+          <a:stretch>
+            <a:fillRect/>
+          </a:stretch>
+        </p:blipFill>
+        <p:spPr>
+          <a:xfrm>
+            <a:off x="5745027" y="3653064"/>
+            <a:ext cx="2500258" cy="3024330"/>
+          </a:xfrm>
+          <a:prstGeom prst="rect">
+            <a:avLst/>
+          </a:prstGeom>
+        </p:spPr>
+      </p:pic>
+      <p:pic>
+        <p:nvPicPr>
+          <p:cNvPr id="11" name="Picture 10" descr="Screen Clipping"/>
+          <p:cNvPicPr>
+            <a:picLocks noChangeAspect="1"/>
+          </p:cNvPicPr>
+          <p:nvPr/>
+        </p:nvPicPr>
+        <p:blipFill>
+          <a:blip r:embed="rId6" cstate="print">
+            <a:extLst>
+              <a:ext uri="{28A0092B-C50C-407E-A947-70E740481C1C}">
+                <a14:useLocalDpi xmlns:a14="http://schemas.microsoft.com/office/drawing/2010/main" val="0"/>
+              </a:ext>
+            </a:extLst>
+          </a:blip>
+          <a:stretch>
+            <a:fillRect/>
+          </a:stretch>
+        </p:blipFill>
+        <p:spPr>
+          <a:xfrm>
+            <a:off x="416928" y="3681159"/>
+            <a:ext cx="1738205" cy="2968139"/>
+          </a:xfrm>
+          <a:prstGeom prst="rect">
+            <a:avLst/>
+          </a:prstGeom>
+        </p:spPr>
+      </p:pic>
+      <p:sp>
+        <p:nvSpPr>
+          <p:cNvPr id="18" name="Oval 17"/>
+          <p:cNvSpPr/>
+          <p:nvPr/>
+        </p:nvSpPr>
+        <p:spPr>
+          <a:xfrm>
+            <a:off x="833118" y="5762161"/>
+            <a:ext cx="229054" cy="228600"/>
+          </a:xfrm>
+          <a:prstGeom prst="ellipse">
+            <a:avLst/>
+          </a:prstGeom>
+        </p:spPr>
+        <p:style>
+          <a:lnRef idx="2">
+            <a:schemeClr val="accent1">
+              <a:shade val="50000"/>
+            </a:schemeClr>
+          </a:lnRef>
+          <a:fillRef idx="1">
+            <a:schemeClr val="accent1"/>
+          </a:fillRef>
+          <a:effectRef idx="0">
+            <a:schemeClr val="accent1"/>
+          </a:effectRef>
+          <a:fontRef idx="minor">
+            <a:schemeClr val="lt1"/>
+          </a:fontRef>
+        </p:style>
+        <p:txBody>
+          <a:bodyPr rtlCol="0" anchor="ctr"/>
+          <a:lstStyle/>
+          <a:p>
+            <a:pPr algn="ctr"/>
+            <a:endParaRPr lang="en-US"/>
+          </a:p>
+        </p:txBody>
+      </p:sp>
     </p:spTree>
     <p:extLst>
       <p:ext uri="{BB962C8B-B14F-4D97-AF65-F5344CB8AC3E}">
-        <p14:creationId xmlns:p14="http://schemas.microsoft.com/office/powerpoint/2010/main" val="973581252"/>
+        <p14:creationId xmlns:p14="http://schemas.microsoft.com/office/powerpoint/2010/main" val="632186089"/>
       </p:ext>
     </p:extLst>
   </p:cSld>
@@ -7267,10 +7293,10 @@
           <a:lstStyle/>
           <a:p>
             <a:r>
-              <a:rPr lang="en-US" b="1" dirty="0" smtClean="0"/>
-              <a:t>Web interface </a:t>
-            </a:r>
-            <a:endParaRPr lang="en-US" b="1" dirty="0"/>
+              <a:rPr lang="en-US" dirty="0" smtClean="0"/>
+              <a:t>UC:11</a:t>
+            </a:r>
+            <a:endParaRPr lang="en-US" dirty="0"/>
           </a:p>
         </p:txBody>
       </p:sp>
@@ -7284,34 +7310,135 @@
             <p:ph idx="1"/>
           </p:nvPr>
         </p:nvSpPr>
+        <p:spPr/>
+        <p:txBody>
+          <a:bodyPr/>
+          <a:lstStyle/>
+          <a:p>
+            <a:r>
+              <a:rPr lang="en-US" dirty="0" smtClean="0"/>
+              <a:t>Employee checks in the spreadsheet </a:t>
+            </a:r>
+          </a:p>
+          <a:p>
+            <a:r>
+              <a:rPr lang="en-US" dirty="0" smtClean="0"/>
+              <a:t>Database connection </a:t>
+            </a:r>
+            <a:endParaRPr lang="en-US" dirty="0"/>
+          </a:p>
+        </p:txBody>
+      </p:sp>
+      <p:pic>
+        <p:nvPicPr>
+          <p:cNvPr id="6" name="Picture 5" descr="Screen Clipping"/>
+          <p:cNvPicPr>
+            <a:picLocks noChangeAspect="1"/>
+          </p:cNvPicPr>
+          <p:nvPr/>
+        </p:nvPicPr>
+        <p:blipFill>
+          <a:blip r:embed="rId2">
+            <a:extLst>
+              <a:ext uri="{28A0092B-C50C-407E-A947-70E740481C1C}">
+                <a14:useLocalDpi xmlns:a14="http://schemas.microsoft.com/office/drawing/2010/main" val="0"/>
+              </a:ext>
+            </a:extLst>
+          </a:blip>
+          <a:stretch>
+            <a:fillRect/>
+          </a:stretch>
+        </p:blipFill>
         <p:spPr>
           <a:xfrm>
-            <a:off x="457200" y="1935480"/>
-            <a:ext cx="8229600" cy="4693920"/>
+            <a:off x="5879958" y="1785486"/>
+            <a:ext cx="2588127" cy="4005715"/>
           </a:xfrm>
+          <a:prstGeom prst="rect">
+            <a:avLst/>
+          </a:prstGeom>
         </p:spPr>
-        <p:txBody>
-          <a:bodyPr>
-            <a:normAutofit/>
-          </a:bodyPr>
-          <a:lstStyle/>
-          <a:p>
-            <a:endParaRPr lang="en-US" dirty="0"/>
+      </p:pic>
+      <p:pic>
+        <p:nvPicPr>
+          <p:cNvPr id="7" name="Picture 6" descr="Screen Clipping"/>
+          <p:cNvPicPr>
+            <a:picLocks noChangeAspect="1"/>
+          </p:cNvPicPr>
+          <p:nvPr/>
+        </p:nvPicPr>
+        <p:blipFill>
+          <a:blip r:embed="rId3">
+            <a:extLst>
+              <a:ext uri="{28A0092B-C50C-407E-A947-70E740481C1C}">
+                <a14:useLocalDpi xmlns:a14="http://schemas.microsoft.com/office/drawing/2010/main" val="0"/>
+              </a:ext>
+            </a:extLst>
+          </a:blip>
+          <a:stretch>
+            <a:fillRect/>
+          </a:stretch>
+        </p:blipFill>
+        <p:spPr>
+          <a:xfrm>
+            <a:off x="2895600" y="2822972"/>
+            <a:ext cx="2271605" cy="3878967"/>
+          </a:xfrm>
+          <a:prstGeom prst="rect">
+            <a:avLst/>
+          </a:prstGeom>
+        </p:spPr>
+      </p:pic>
+      <p:sp>
+        <p:nvSpPr>
+          <p:cNvPr id="8" name="Oval 7"/>
+          <p:cNvSpPr/>
+          <p:nvPr/>
+        </p:nvSpPr>
+        <p:spPr>
+          <a:xfrm>
+            <a:off x="3505200" y="5105400"/>
+            <a:ext cx="229054" cy="228600"/>
+          </a:xfrm>
+          <a:prstGeom prst="ellipse">
+            <a:avLst/>
+          </a:prstGeom>
+        </p:spPr>
+        <p:style>
+          <a:lnRef idx="2">
+            <a:schemeClr val="accent1">
+              <a:shade val="50000"/>
+            </a:schemeClr>
+          </a:lnRef>
+          <a:fillRef idx="1">
+            <a:schemeClr val="accent1"/>
+          </a:fillRef>
+          <a:effectRef idx="0">
+            <a:schemeClr val="accent1"/>
+          </a:effectRef>
+          <a:fontRef idx="minor">
+            <a:schemeClr val="lt1"/>
+          </a:fontRef>
+        </p:style>
+        <p:txBody>
+          <a:bodyPr rtlCol="0" anchor="ctr"/>
+          <a:lstStyle/>
+          <a:p>
+            <a:pPr algn="ctr"/>
+            <a:endParaRPr lang="en-US"/>
           </a:p>
         </p:txBody>
       </p:sp>
     </p:spTree>
+    <p:extLst>
+      <p:ext uri="{BB962C8B-B14F-4D97-AF65-F5344CB8AC3E}">
+        <p14:creationId xmlns:p14="http://schemas.microsoft.com/office/powerpoint/2010/main" val="2408467826"/>
+      </p:ext>
+    </p:extLst>
   </p:cSld>
   <p:clrMapOvr>
     <a:masterClrMapping/>
   </p:clrMapOvr>
-  <p:timing>
-    <p:tnLst>
-      <p:par>
-        <p:cTn id="1" dur="indefinite" restart="never" nodeType="tmRoot"/>
-      </p:par>
-    </p:tnLst>
-  </p:timing>
 </p:sld>
 </file>
 
@@ -7347,6 +7474,753 @@
           <a:bodyPr/>
           <a:lstStyle/>
           <a:p>
+            <a:endParaRPr lang="en-US"/>
+          </a:p>
+        </p:txBody>
+      </p:sp>
+      <p:sp>
+        <p:nvSpPr>
+          <p:cNvPr id="3" name="Content Placeholder 2"/>
+          <p:cNvSpPr>
+            <a:spLocks noGrp="1"/>
+          </p:cNvSpPr>
+          <p:nvPr>
+            <p:ph idx="1"/>
+          </p:nvPr>
+        </p:nvSpPr>
+        <p:spPr/>
+        <p:txBody>
+          <a:bodyPr/>
+          <a:lstStyle/>
+          <a:p>
+            <a:r>
+              <a:rPr lang="en-US" dirty="0" smtClean="0"/>
+              <a:t>Employee views schedule </a:t>
+            </a:r>
+            <a:endParaRPr lang="en-US" dirty="0"/>
+          </a:p>
+        </p:txBody>
+      </p:sp>
+      <p:pic>
+        <p:nvPicPr>
+          <p:cNvPr id="6" name="Picture 5" descr="Screen Clipping"/>
+          <p:cNvPicPr>
+            <a:picLocks noChangeAspect="1"/>
+          </p:cNvPicPr>
+          <p:nvPr/>
+        </p:nvPicPr>
+        <p:blipFill>
+          <a:blip r:embed="rId2">
+            <a:extLst>
+              <a:ext uri="{28A0092B-C50C-407E-A947-70E740481C1C}">
+                <a14:useLocalDpi xmlns:a14="http://schemas.microsoft.com/office/drawing/2010/main" val="0"/>
+              </a:ext>
+            </a:extLst>
+          </a:blip>
+          <a:stretch>
+            <a:fillRect/>
+          </a:stretch>
+        </p:blipFill>
+        <p:spPr>
+          <a:xfrm>
+            <a:off x="3352800" y="2767872"/>
+            <a:ext cx="2198357" cy="3338968"/>
+          </a:xfrm>
+          <a:prstGeom prst="rect">
+            <a:avLst/>
+          </a:prstGeom>
+        </p:spPr>
+      </p:pic>
+      <p:pic>
+        <p:nvPicPr>
+          <p:cNvPr id="7" name="Picture 6" descr="Screen Clipping"/>
+          <p:cNvPicPr>
+            <a:picLocks noChangeAspect="1"/>
+          </p:cNvPicPr>
+          <p:nvPr/>
+        </p:nvPicPr>
+        <p:blipFill>
+          <a:blip r:embed="rId3">
+            <a:extLst>
+              <a:ext uri="{28A0092B-C50C-407E-A947-70E740481C1C}">
+                <a14:useLocalDpi xmlns:a14="http://schemas.microsoft.com/office/drawing/2010/main" val="0"/>
+              </a:ext>
+            </a:extLst>
+          </a:blip>
+          <a:stretch>
+            <a:fillRect/>
+          </a:stretch>
+        </p:blipFill>
+        <p:spPr>
+          <a:xfrm>
+            <a:off x="6172200" y="2780935"/>
+            <a:ext cx="2503101" cy="3010266"/>
+          </a:xfrm>
+          <a:prstGeom prst="rect">
+            <a:avLst/>
+          </a:prstGeom>
+        </p:spPr>
+      </p:pic>
+      <p:pic>
+        <p:nvPicPr>
+          <p:cNvPr id="8" name="Picture 7" descr="Screen Clipping"/>
+          <p:cNvPicPr>
+            <a:picLocks noChangeAspect="1"/>
+          </p:cNvPicPr>
+          <p:nvPr/>
+        </p:nvPicPr>
+        <p:blipFill>
+          <a:blip r:embed="rId4" cstate="print">
+            <a:extLst>
+              <a:ext uri="{28A0092B-C50C-407E-A947-70E740481C1C}">
+                <a14:useLocalDpi xmlns:a14="http://schemas.microsoft.com/office/drawing/2010/main" val="0"/>
+              </a:ext>
+            </a:extLst>
+          </a:blip>
+          <a:stretch>
+            <a:fillRect/>
+          </a:stretch>
+        </p:blipFill>
+        <p:spPr>
+          <a:xfrm>
+            <a:off x="533400" y="3171358"/>
+            <a:ext cx="1738205" cy="2968139"/>
+          </a:xfrm>
+          <a:prstGeom prst="rect">
+            <a:avLst/>
+          </a:prstGeom>
+        </p:spPr>
+      </p:pic>
+      <p:sp>
+        <p:nvSpPr>
+          <p:cNvPr id="9" name="Oval 8"/>
+          <p:cNvSpPr/>
+          <p:nvPr/>
+        </p:nvSpPr>
+        <p:spPr>
+          <a:xfrm>
+            <a:off x="838200" y="4541127"/>
+            <a:ext cx="229054" cy="228600"/>
+          </a:xfrm>
+          <a:prstGeom prst="ellipse">
+            <a:avLst/>
+          </a:prstGeom>
+        </p:spPr>
+        <p:style>
+          <a:lnRef idx="2">
+            <a:schemeClr val="accent1">
+              <a:shade val="50000"/>
+            </a:schemeClr>
+          </a:lnRef>
+          <a:fillRef idx="1">
+            <a:schemeClr val="accent1"/>
+          </a:fillRef>
+          <a:effectRef idx="0">
+            <a:schemeClr val="accent1"/>
+          </a:effectRef>
+          <a:fontRef idx="minor">
+            <a:schemeClr val="lt1"/>
+          </a:fontRef>
+        </p:style>
+        <p:txBody>
+          <a:bodyPr rtlCol="0" anchor="ctr"/>
+          <a:lstStyle/>
+          <a:p>
+            <a:pPr algn="ctr"/>
+            <a:endParaRPr lang="en-US"/>
+          </a:p>
+        </p:txBody>
+      </p:sp>
+    </p:spTree>
+    <p:extLst>
+      <p:ext uri="{BB962C8B-B14F-4D97-AF65-F5344CB8AC3E}">
+        <p14:creationId xmlns:p14="http://schemas.microsoft.com/office/powerpoint/2010/main" val="3359813952"/>
+      </p:ext>
+    </p:extLst>
+  </p:cSld>
+  <p:clrMapOvr>
+    <a:masterClrMapping/>
+  </p:clrMapOvr>
+</p:sld>
+</file>
+
+<file path=ppt/slides/slide13.xml><?xml version="1.0" encoding="utf-8"?>
+<p:sld xmlns:a="http://schemas.openxmlformats.org/drawingml/2006/main" xmlns:r="http://schemas.openxmlformats.org/officeDocument/2006/relationships" xmlns:p="http://schemas.openxmlformats.org/presentationml/2006/main">
+  <p:cSld>
+    <p:spTree>
+      <p:nvGrpSpPr>
+        <p:cNvPr id="1" name=""/>
+        <p:cNvGrpSpPr/>
+        <p:nvPr/>
+      </p:nvGrpSpPr>
+      <p:grpSpPr>
+        <a:xfrm>
+          <a:off x="0" y="0"/>
+          <a:ext cx="0" cy="0"/>
+          <a:chOff x="0" y="0"/>
+          <a:chExt cx="0" cy="0"/>
+        </a:xfrm>
+      </p:grpSpPr>
+      <p:sp>
+        <p:nvSpPr>
+          <p:cNvPr id="2" name="Title 1"/>
+          <p:cNvSpPr>
+            <a:spLocks noGrp="1"/>
+          </p:cNvSpPr>
+          <p:nvPr>
+            <p:ph type="title"/>
+          </p:nvPr>
+        </p:nvSpPr>
+        <p:spPr/>
+        <p:txBody>
+          <a:bodyPr/>
+          <a:lstStyle/>
+          <a:p>
+            <a:r>
+              <a:rPr lang="en-US" dirty="0" smtClean="0"/>
+              <a:t>UC 12</a:t>
+            </a:r>
+            <a:endParaRPr lang="en-US" dirty="0"/>
+          </a:p>
+        </p:txBody>
+      </p:sp>
+      <p:sp>
+        <p:nvSpPr>
+          <p:cNvPr id="3" name="Content Placeholder 2"/>
+          <p:cNvSpPr>
+            <a:spLocks noGrp="1"/>
+          </p:cNvSpPr>
+          <p:nvPr>
+            <p:ph idx="1"/>
+          </p:nvPr>
+        </p:nvSpPr>
+        <p:spPr/>
+        <p:txBody>
+          <a:bodyPr/>
+          <a:lstStyle/>
+          <a:p>
+            <a:r>
+              <a:rPr lang="en-US" dirty="0" smtClean="0"/>
+              <a:t>Employee sets alarms </a:t>
+            </a:r>
+            <a:endParaRPr lang="en-US" dirty="0"/>
+          </a:p>
+        </p:txBody>
+      </p:sp>
+      <p:pic>
+        <p:nvPicPr>
+          <p:cNvPr id="4" name="Picture 3" descr="Screen Clipping"/>
+          <p:cNvPicPr>
+            <a:picLocks noChangeAspect="1"/>
+          </p:cNvPicPr>
+          <p:nvPr/>
+        </p:nvPicPr>
+        <p:blipFill>
+          <a:blip r:embed="rId2" cstate="print">
+            <a:extLst>
+              <a:ext uri="{28A0092B-C50C-407E-A947-70E740481C1C}">
+                <a14:useLocalDpi xmlns:a14="http://schemas.microsoft.com/office/drawing/2010/main" val="0"/>
+              </a:ext>
+            </a:extLst>
+          </a:blip>
+          <a:stretch>
+            <a:fillRect/>
+          </a:stretch>
+        </p:blipFill>
+        <p:spPr>
+          <a:xfrm>
+            <a:off x="416928" y="3681159"/>
+            <a:ext cx="1738205" cy="2968139"/>
+          </a:xfrm>
+          <a:prstGeom prst="rect">
+            <a:avLst/>
+          </a:prstGeom>
+        </p:spPr>
+      </p:pic>
+      <p:sp>
+        <p:nvSpPr>
+          <p:cNvPr id="5" name="Oval 4"/>
+          <p:cNvSpPr/>
+          <p:nvPr/>
+        </p:nvSpPr>
+        <p:spPr>
+          <a:xfrm>
+            <a:off x="838200" y="4648200"/>
+            <a:ext cx="229054" cy="228600"/>
+          </a:xfrm>
+          <a:prstGeom prst="ellipse">
+            <a:avLst/>
+          </a:prstGeom>
+        </p:spPr>
+        <p:style>
+          <a:lnRef idx="2">
+            <a:schemeClr val="accent1">
+              <a:shade val="50000"/>
+            </a:schemeClr>
+          </a:lnRef>
+          <a:fillRef idx="1">
+            <a:schemeClr val="accent1"/>
+          </a:fillRef>
+          <a:effectRef idx="0">
+            <a:schemeClr val="accent1"/>
+          </a:effectRef>
+          <a:fontRef idx="minor">
+            <a:schemeClr val="lt1"/>
+          </a:fontRef>
+        </p:style>
+        <p:txBody>
+          <a:bodyPr rtlCol="0" anchor="ctr"/>
+          <a:lstStyle/>
+          <a:p>
+            <a:pPr algn="ctr"/>
+            <a:endParaRPr lang="en-US"/>
+          </a:p>
+        </p:txBody>
+      </p:sp>
+    </p:spTree>
+    <p:extLst>
+      <p:ext uri="{BB962C8B-B14F-4D97-AF65-F5344CB8AC3E}">
+        <p14:creationId xmlns:p14="http://schemas.microsoft.com/office/powerpoint/2010/main" val="1909005890"/>
+      </p:ext>
+    </p:extLst>
+  </p:cSld>
+  <p:clrMapOvr>
+    <a:masterClrMapping/>
+  </p:clrMapOvr>
+</p:sld>
+</file>
+
+<file path=ppt/slides/slide14.xml><?xml version="1.0" encoding="utf-8"?>
+<p:sld xmlns:a="http://schemas.openxmlformats.org/drawingml/2006/main" xmlns:r="http://schemas.openxmlformats.org/officeDocument/2006/relationships" xmlns:p="http://schemas.openxmlformats.org/presentationml/2006/main">
+  <p:cSld>
+    <p:spTree>
+      <p:nvGrpSpPr>
+        <p:cNvPr id="1" name=""/>
+        <p:cNvGrpSpPr/>
+        <p:nvPr/>
+      </p:nvGrpSpPr>
+      <p:grpSpPr>
+        <a:xfrm>
+          <a:off x="0" y="0"/>
+          <a:ext cx="0" cy="0"/>
+          <a:chOff x="0" y="0"/>
+          <a:chExt cx="0" cy="0"/>
+        </a:xfrm>
+      </p:grpSpPr>
+      <p:sp>
+        <p:nvSpPr>
+          <p:cNvPr id="2" name="Title 1"/>
+          <p:cNvSpPr>
+            <a:spLocks noGrp="1"/>
+          </p:cNvSpPr>
+          <p:nvPr>
+            <p:ph type="title"/>
+          </p:nvPr>
+        </p:nvSpPr>
+        <p:spPr>
+          <a:xfrm>
+            <a:off x="744955" y="609600"/>
+            <a:ext cx="7765322" cy="970450"/>
+          </a:xfrm>
+        </p:spPr>
+        <p:txBody>
+          <a:bodyPr>
+            <a:normAutofit/>
+          </a:bodyPr>
+          <a:lstStyle/>
+          <a:p>
+            <a:r>
+              <a:rPr lang="en-US" b="1" dirty="0" smtClean="0"/>
+              <a:t>Web Interface </a:t>
+            </a:r>
+            <a:endParaRPr lang="en-US" b="1" dirty="0"/>
+          </a:p>
+        </p:txBody>
+      </p:sp>
+      <p:sp>
+        <p:nvSpPr>
+          <p:cNvPr id="3" name="Content Placeholder 2"/>
+          <p:cNvSpPr>
+            <a:spLocks noGrp="1"/>
+          </p:cNvSpPr>
+          <p:nvPr>
+            <p:ph idx="1"/>
+          </p:nvPr>
+        </p:nvSpPr>
+        <p:spPr>
+          <a:xfrm>
+            <a:off x="744955" y="1676400"/>
+            <a:ext cx="7765322" cy="4058751"/>
+          </a:xfrm>
+        </p:spPr>
+        <p:txBody>
+          <a:bodyPr/>
+          <a:lstStyle/>
+          <a:p>
+            <a:pPr>
+              <a:buNone/>
+            </a:pPr>
+            <a:endParaRPr lang="en-US" dirty="0" smtClean="0"/>
+          </a:p>
+          <a:p>
+            <a:pPr>
+              <a:buNone/>
+            </a:pPr>
+            <a:endParaRPr lang="en-US" dirty="0" smtClean="0"/>
+          </a:p>
+          <a:p>
+            <a:pPr>
+              <a:buNone/>
+            </a:pPr>
+            <a:endParaRPr lang="en-US" dirty="0"/>
+          </a:p>
+        </p:txBody>
+      </p:sp>
+      <p:sp>
+        <p:nvSpPr>
+          <p:cNvPr id="5" name="TextBox 4"/>
+          <p:cNvSpPr txBox="1"/>
+          <p:nvPr/>
+        </p:nvSpPr>
+        <p:spPr>
+          <a:xfrm>
+            <a:off x="228600" y="1935480"/>
+            <a:ext cx="8610599" cy="3243965"/>
+          </a:xfrm>
+          <a:prstGeom prst="rect">
+            <a:avLst/>
+          </a:prstGeom>
+          <a:noFill/>
+        </p:spPr>
+        <p:txBody>
+          <a:bodyPr wrap="square" rtlCol="0">
+            <a:spAutoFit/>
+          </a:bodyPr>
+          <a:lstStyle/>
+          <a:p>
+            <a:pPr marL="342900" indent="-306000" defTabSz="457200">
+              <a:spcBef>
+                <a:spcPct val="20000"/>
+              </a:spcBef>
+              <a:spcAft>
+                <a:spcPts val="600"/>
+              </a:spcAft>
+              <a:buClr>
+                <a:schemeClr val="tx2"/>
+              </a:buClr>
+              <a:buSzPct val="70000"/>
+              <a:buFont typeface="Wingdings 2" charset="2"/>
+              <a:buChar char=""/>
+            </a:pPr>
+            <a:r>
+              <a:rPr lang="en-US" sz="2800" dirty="0" smtClean="0">
+                <a:ln>
+                  <a:solidFill>
+                    <a:schemeClr val="bg1">
+                      <a:lumMod val="75000"/>
+                      <a:lumOff val="25000"/>
+                      <a:alpha val="10000"/>
+                    </a:schemeClr>
+                  </a:solidFill>
+                </a:ln>
+                <a:solidFill>
+                  <a:schemeClr val="tx2"/>
+                </a:solidFill>
+                <a:effectLst>
+                  <a:outerShdw blurRad="9525" dist="25400" dir="14640000" algn="tl" rotWithShape="0">
+                    <a:schemeClr val="bg1">
+                      <a:alpha val="30000"/>
+                    </a:schemeClr>
+                  </a:outerShdw>
+                </a:effectLst>
+              </a:rPr>
+              <a:t>UC:16 Employee/manager logs in through the web interface</a:t>
+            </a:r>
+          </a:p>
+          <a:p>
+            <a:pPr marL="342900" indent="-306000" defTabSz="457200">
+              <a:spcBef>
+                <a:spcPct val="20000"/>
+              </a:spcBef>
+              <a:spcAft>
+                <a:spcPts val="600"/>
+              </a:spcAft>
+              <a:buClr>
+                <a:schemeClr val="tx2"/>
+              </a:buClr>
+              <a:buSzPct val="70000"/>
+              <a:buFont typeface="Wingdings 2" charset="2"/>
+              <a:buChar char=""/>
+            </a:pPr>
+            <a:r>
+              <a:rPr lang="en-US" sz="2800" dirty="0" smtClean="0">
+                <a:ln>
+                  <a:solidFill>
+                    <a:schemeClr val="bg1">
+                      <a:lumMod val="75000"/>
+                      <a:lumOff val="25000"/>
+                      <a:alpha val="10000"/>
+                    </a:schemeClr>
+                  </a:solidFill>
+                </a:ln>
+                <a:solidFill>
+                  <a:schemeClr val="tx2"/>
+                </a:solidFill>
+                <a:effectLst>
+                  <a:outerShdw blurRad="9525" dist="25400" dir="14640000" algn="tl" rotWithShape="0">
+                    <a:schemeClr val="bg1">
+                      <a:alpha val="30000"/>
+                    </a:schemeClr>
+                  </a:outerShdw>
+                </a:effectLst>
+              </a:rPr>
+              <a:t>UC:10,14 Employee logs in/out from web interface </a:t>
+            </a:r>
+          </a:p>
+          <a:p>
+            <a:pPr marL="342900" indent="-306000" defTabSz="457200">
+              <a:spcBef>
+                <a:spcPct val="20000"/>
+              </a:spcBef>
+              <a:spcAft>
+                <a:spcPts val="600"/>
+              </a:spcAft>
+              <a:buClr>
+                <a:schemeClr val="tx2"/>
+              </a:buClr>
+              <a:buSzPct val="70000"/>
+              <a:buFont typeface="Wingdings 2" charset="2"/>
+              <a:buChar char=""/>
+            </a:pPr>
+            <a:r>
+              <a:rPr lang="en-US" sz="2800" dirty="0" smtClean="0">
+                <a:ln>
+                  <a:solidFill>
+                    <a:schemeClr val="bg1">
+                      <a:lumMod val="75000"/>
+                      <a:lumOff val="25000"/>
+                      <a:alpha val="10000"/>
+                    </a:schemeClr>
+                  </a:solidFill>
+                </a:ln>
+                <a:solidFill>
+                  <a:schemeClr val="tx2"/>
+                </a:solidFill>
+                <a:effectLst>
+                  <a:outerShdw blurRad="9525" dist="25400" dir="14640000" algn="tl" rotWithShape="0">
+                    <a:schemeClr val="bg1">
+                      <a:alpha val="30000"/>
+                    </a:schemeClr>
+                  </a:outerShdw>
+                </a:effectLst>
+              </a:rPr>
+              <a:t> UC:13 Manager sets employee schedule</a:t>
+            </a:r>
+          </a:p>
+          <a:p>
+            <a:pPr marL="342900" indent="-306000" defTabSz="457200">
+              <a:spcBef>
+                <a:spcPct val="20000"/>
+              </a:spcBef>
+              <a:spcAft>
+                <a:spcPts val="600"/>
+              </a:spcAft>
+              <a:buClr>
+                <a:schemeClr val="tx2"/>
+              </a:buClr>
+              <a:buSzPct val="70000"/>
+              <a:buFont typeface="Wingdings 2" charset="2"/>
+              <a:buChar char=""/>
+            </a:pPr>
+            <a:r>
+              <a:rPr lang="en-US" sz="2800" dirty="0" smtClean="0">
+                <a:ln>
+                  <a:solidFill>
+                    <a:schemeClr val="bg1">
+                      <a:lumMod val="75000"/>
+                      <a:lumOff val="25000"/>
+                      <a:alpha val="10000"/>
+                    </a:schemeClr>
+                  </a:solidFill>
+                </a:ln>
+                <a:solidFill>
+                  <a:schemeClr val="tx2"/>
+                </a:solidFill>
+                <a:effectLst>
+                  <a:outerShdw blurRad="9525" dist="25400" dir="14640000" algn="tl" rotWithShape="0">
+                    <a:schemeClr val="bg1">
+                      <a:alpha val="30000"/>
+                    </a:schemeClr>
+                  </a:outerShdw>
+                </a:effectLst>
+              </a:rPr>
+              <a:t> UC:15 Manager </a:t>
+            </a:r>
+            <a:r>
+              <a:rPr lang="en-US" sz="2800" dirty="0" smtClean="0">
+                <a:ln>
+                  <a:solidFill>
+                    <a:schemeClr val="bg1">
+                      <a:lumMod val="75000"/>
+                      <a:lumOff val="25000"/>
+                      <a:alpha val="10000"/>
+                    </a:schemeClr>
+                  </a:solidFill>
+                </a:ln>
+                <a:solidFill>
+                  <a:schemeClr val="tx2"/>
+                </a:solidFill>
+                <a:effectLst>
+                  <a:outerShdw blurRad="9525" dist="25400" dir="14640000" algn="tl" rotWithShape="0">
+                    <a:schemeClr val="bg1">
+                      <a:alpha val="30000"/>
+                    </a:schemeClr>
+                  </a:outerShdw>
+                </a:effectLst>
+              </a:rPr>
+              <a:t>acc</a:t>
+            </a:r>
+            <a:r>
+              <a:rPr lang="en-US" sz="2800" dirty="0" smtClean="0">
+                <a:ln>
+                  <a:solidFill>
+                    <a:schemeClr val="bg1">
+                      <a:lumMod val="75000"/>
+                      <a:lumOff val="25000"/>
+                      <a:alpha val="10000"/>
+                    </a:schemeClr>
+                  </a:solidFill>
+                </a:ln>
+                <a:solidFill>
+                  <a:schemeClr val="tx2"/>
+                </a:solidFill>
+                <a:effectLst>
+                  <a:outerShdw blurRad="9525" dist="25400" dir="14640000" algn="tl" rotWithShape="0">
+                    <a:schemeClr val="bg1">
+                      <a:alpha val="30000"/>
+                    </a:schemeClr>
+                  </a:outerShdw>
+                </a:effectLst>
+              </a:rPr>
+              <a:t>esses the web based report</a:t>
+            </a:r>
+            <a:endParaRPr lang="en-US" sz="2800" dirty="0">
+              <a:ln>
+                <a:solidFill>
+                  <a:schemeClr val="bg1">
+                    <a:lumMod val="75000"/>
+                    <a:lumOff val="25000"/>
+                    <a:alpha val="10000"/>
+                  </a:schemeClr>
+                </a:solidFill>
+              </a:ln>
+              <a:solidFill>
+                <a:schemeClr val="tx2"/>
+              </a:solidFill>
+              <a:effectLst>
+                <a:outerShdw blurRad="9525" dist="25400" dir="14640000" algn="tl" rotWithShape="0">
+                  <a:schemeClr val="bg1">
+                    <a:alpha val="30000"/>
+                  </a:schemeClr>
+                </a:outerShdw>
+              </a:effectLst>
+            </a:endParaRPr>
+          </a:p>
+          <a:p>
+            <a:pPr marL="285750" indent="-285750">
+              <a:buFont typeface="Arial" panose="020B0604020202020204" pitchFamily="34" charset="0"/>
+              <a:buChar char="•"/>
+            </a:pPr>
+            <a:endParaRPr lang="en-US" sz="2800" dirty="0"/>
+          </a:p>
+        </p:txBody>
+      </p:sp>
+      <p:sp>
+        <p:nvSpPr>
+          <p:cNvPr id="4" name="TextBox 3"/>
+          <p:cNvSpPr txBox="1"/>
+          <p:nvPr/>
+        </p:nvSpPr>
+        <p:spPr>
+          <a:xfrm>
+            <a:off x="1066800" y="5410200"/>
+            <a:ext cx="5791200" cy="507831"/>
+          </a:xfrm>
+          <a:prstGeom prst="rect">
+            <a:avLst/>
+          </a:prstGeom>
+          <a:noFill/>
+        </p:spPr>
+        <p:txBody>
+          <a:bodyPr wrap="square" rtlCol="0">
+            <a:spAutoFit/>
+          </a:bodyPr>
+          <a:lstStyle/>
+          <a:p>
+            <a:r>
+              <a:rPr lang="en-US" dirty="0" smtClean="0"/>
+              <a:t>Look yourself!:    </a:t>
+            </a:r>
+            <a:r>
+              <a:rPr lang="en-US" sz="2700" dirty="0" smtClean="0"/>
+              <a:t>www.group6project.com</a:t>
+            </a:r>
+            <a:endParaRPr lang="en-US" sz="2700" dirty="0"/>
+          </a:p>
+        </p:txBody>
+      </p:sp>
+    </p:spTree>
+    <p:extLst>
+      <p:ext uri="{BB962C8B-B14F-4D97-AF65-F5344CB8AC3E}">
+        <p14:creationId xmlns:p14="http://schemas.microsoft.com/office/powerpoint/2010/main" val="2542402137"/>
+      </p:ext>
+    </p:extLst>
+  </p:cSld>
+  <p:clrMapOvr>
+    <a:masterClrMapping/>
+  </p:clrMapOvr>
+  <p:timing>
+    <p:tnLst>
+      <p:par>
+        <p:cTn id="1" dur="indefinite" restart="never" nodeType="tmRoot"/>
+      </p:par>
+    </p:tnLst>
+  </p:timing>
+</p:sld>
+</file>
+
+<file path=ppt/slides/slide15.xml><?xml version="1.0" encoding="utf-8"?>
+<p:sld xmlns:a="http://schemas.openxmlformats.org/drawingml/2006/main" xmlns:r="http://schemas.openxmlformats.org/officeDocument/2006/relationships" xmlns:p="http://schemas.openxmlformats.org/presentationml/2006/main">
+  <p:cSld>
+    <p:spTree>
+      <p:nvGrpSpPr>
+        <p:cNvPr id="1" name=""/>
+        <p:cNvGrpSpPr/>
+        <p:nvPr/>
+      </p:nvGrpSpPr>
+      <p:grpSpPr>
+        <a:xfrm>
+          <a:off x="0" y="0"/>
+          <a:ext cx="0" cy="0"/>
+          <a:chOff x="0" y="0"/>
+          <a:chExt cx="0" cy="0"/>
+        </a:xfrm>
+      </p:grpSpPr>
+      <p:sp>
+        <p:nvSpPr>
+          <p:cNvPr id="2" name="Title 1"/>
+          <p:cNvSpPr>
+            <a:spLocks noGrp="1"/>
+          </p:cNvSpPr>
+          <p:nvPr>
+            <p:ph type="title"/>
+          </p:nvPr>
+        </p:nvSpPr>
+        <p:spPr/>
+        <p:txBody>
+          <a:bodyPr/>
+          <a:lstStyle/>
+          <a:p>
             <a:r>
               <a:rPr lang="en-US" b="1" dirty="0" smtClean="0"/>
               <a:t>Lessons learnt</a:t>
@@ -7398,7 +8272,7 @@
 </p:sld>
 </file>
 
-<file path=ppt/slides/slide13.xml><?xml version="1.0" encoding="utf-8"?>
+<file path=ppt/slides/slide16.xml><?xml version="1.0" encoding="utf-8"?>
 <p:sld xmlns:a="http://schemas.openxmlformats.org/drawingml/2006/main" xmlns:r="http://schemas.openxmlformats.org/officeDocument/2006/relationships" xmlns:p="http://schemas.openxmlformats.org/presentationml/2006/main">
   <p:cSld>
     <p:spTree>
@@ -8191,6 +9065,82 @@
             <p:ph type="title"/>
           </p:nvPr>
         </p:nvSpPr>
+        <p:spPr/>
+        <p:txBody>
+          <a:bodyPr/>
+          <a:lstStyle/>
+          <a:p>
+            <a:r>
+              <a:rPr lang="en-US" dirty="0" smtClean="0"/>
+              <a:t>API overview	</a:t>
+            </a:r>
+            <a:endParaRPr lang="en-US" dirty="0"/>
+          </a:p>
+        </p:txBody>
+      </p:sp>
+      <p:sp>
+        <p:nvSpPr>
+          <p:cNvPr id="3" name="Content Placeholder 2"/>
+          <p:cNvSpPr>
+            <a:spLocks noGrp="1"/>
+          </p:cNvSpPr>
+          <p:nvPr>
+            <p:ph idx="1"/>
+          </p:nvPr>
+        </p:nvSpPr>
+        <p:spPr/>
+        <p:txBody>
+          <a:bodyPr/>
+          <a:lstStyle/>
+          <a:p>
+            <a:r>
+              <a:rPr lang="en-US" dirty="0" smtClean="0"/>
+              <a:t>David, fill it in</a:t>
+            </a:r>
+            <a:endParaRPr lang="en-US" dirty="0"/>
+          </a:p>
+        </p:txBody>
+      </p:sp>
+    </p:spTree>
+    <p:extLst>
+      <p:ext uri="{BB962C8B-B14F-4D97-AF65-F5344CB8AC3E}">
+        <p14:creationId xmlns:p14="http://schemas.microsoft.com/office/powerpoint/2010/main" val="3469123171"/>
+      </p:ext>
+    </p:extLst>
+  </p:cSld>
+  <p:clrMapOvr>
+    <a:masterClrMapping/>
+  </p:clrMapOvr>
+</p:sld>
+</file>
+
+<file path=ppt/slides/slide6.xml><?xml version="1.0" encoding="utf-8"?>
+<p:sld xmlns:a="http://schemas.openxmlformats.org/drawingml/2006/main" xmlns:r="http://schemas.openxmlformats.org/officeDocument/2006/relationships" xmlns:p="http://schemas.openxmlformats.org/presentationml/2006/main">
+  <p:cSld>
+    <p:spTree>
+      <p:nvGrpSpPr>
+        <p:cNvPr id="1" name=""/>
+        <p:cNvGrpSpPr/>
+        <p:nvPr/>
+      </p:nvGrpSpPr>
+      <p:grpSpPr>
+        <a:xfrm>
+          <a:off x="0" y="0"/>
+          <a:ext cx="0" cy="0"/>
+          <a:chOff x="0" y="0"/>
+          <a:chExt cx="0" cy="0"/>
+        </a:xfrm>
+      </p:grpSpPr>
+      <p:sp>
+        <p:nvSpPr>
+          <p:cNvPr id="2" name="Title 1"/>
+          <p:cNvSpPr>
+            <a:spLocks noGrp="1"/>
+          </p:cNvSpPr>
+          <p:nvPr>
+            <p:ph type="title"/>
+          </p:nvPr>
+        </p:nvSpPr>
         <p:spPr>
           <a:xfrm>
             <a:off x="685800" y="0"/>
@@ -8268,7 +9218,7 @@
 </p:sld>
 </file>
 
-<file path=ppt/slides/slide6.xml><?xml version="1.0" encoding="utf-8"?>
+<file path=ppt/slides/slide7.xml><?xml version="1.0" encoding="utf-8"?>
 <p:sld xmlns:a="http://schemas.openxmlformats.org/drawingml/2006/main" xmlns:r="http://schemas.openxmlformats.org/officeDocument/2006/relationships" xmlns:p="http://schemas.openxmlformats.org/presentationml/2006/main">
   <p:cSld>
     <p:spTree>
@@ -8309,47 +9259,9 @@
           <a:p>
             <a:r>
               <a:rPr lang="en-US" b="1" dirty="0" smtClean="0"/>
-              <a:t>UC: </a:t>
-            </a:r>
-            <a:r>
-              <a:rPr lang="en-US" b="1" dirty="0" smtClean="0"/>
-              <a:t>1,2 </a:t>
+              <a:t>UC:1,2,3,4 </a:t>
             </a:r>
             <a:endParaRPr lang="en-US" b="1" dirty="0"/>
-          </a:p>
-        </p:txBody>
-      </p:sp>
-      <p:sp>
-        <p:nvSpPr>
-          <p:cNvPr id="3" name="Content Placeholder 2"/>
-          <p:cNvSpPr>
-            <a:spLocks noGrp="1"/>
-          </p:cNvSpPr>
-          <p:nvPr>
-            <p:ph idx="1"/>
-          </p:nvPr>
-        </p:nvSpPr>
-        <p:spPr/>
-        <p:txBody>
-          <a:bodyPr/>
-          <a:lstStyle/>
-          <a:p>
-            <a:pPr>
-              <a:buNone/>
-            </a:pPr>
-            <a:endParaRPr lang="en-US" dirty="0" smtClean="0"/>
-          </a:p>
-          <a:p>
-            <a:pPr>
-              <a:buNone/>
-            </a:pPr>
-            <a:endParaRPr lang="en-US" dirty="0" smtClean="0"/>
-          </a:p>
-          <a:p>
-            <a:pPr>
-              <a:buNone/>
-            </a:pPr>
-            <a:endParaRPr lang="en-US" dirty="0"/>
           </a:p>
         </p:txBody>
       </p:sp>
@@ -8361,8 +9273,8 @@
         </p:nvSpPr>
         <p:spPr>
           <a:xfrm>
-            <a:off x="228601" y="1935480"/>
-            <a:ext cx="4800600" cy="754053"/>
+            <a:off x="433078" y="1524000"/>
+            <a:ext cx="8077199" cy="2634567"/>
           </a:xfrm>
           <a:prstGeom prst="rect">
             <a:avLst/>
@@ -8390,7 +9302,7 @@
               <a:buChar char=""/>
             </a:pPr>
             <a:r>
-              <a:rPr lang="en-US" sz="2000" dirty="0">
+              <a:rPr lang="en-US" sz="2200" dirty="0" smtClean="0">
                 <a:ln>
                   <a:solidFill>
                     <a:schemeClr val="bg1">
@@ -8411,190 +9323,9 @@
                   </a:outerShdw>
                 </a:effectLst>
               </a:rPr>
-              <a:t>At </a:t>
-            </a:r>
-          </a:p>
-          <a:p>
-            <a:pPr marL="285750" indent="-285750">
-              <a:buFont typeface="Arial" panose="020B0604020202020204" pitchFamily="34" charset="0"/>
-              <a:buChar char="•"/>
-            </a:pPr>
-            <a:endParaRPr lang="en-US" dirty="0"/>
-          </a:p>
-        </p:txBody>
-      </p:sp>
-      <p:sp>
-        <p:nvSpPr>
-          <p:cNvPr id="8" name="TextBox 7"/>
-          <p:cNvSpPr txBox="1"/>
-          <p:nvPr/>
-        </p:nvSpPr>
-        <p:spPr>
-          <a:xfrm>
-            <a:off x="5714999" y="6275697"/>
-            <a:ext cx="2828925" cy="646331"/>
-          </a:xfrm>
-          <a:prstGeom prst="rect">
-            <a:avLst/>
-          </a:prstGeom>
-          <a:noFill/>
-        </p:spPr>
-        <p:txBody>
-          <a:bodyPr wrap="square" rtlCol="0">
-            <a:spAutoFit/>
-          </a:bodyPr>
-          <a:lstStyle/>
-          <a:p>
-            <a:pPr algn="ctr"/>
-            <a:r>
-              <a:rPr lang="en-US" dirty="0" smtClean="0"/>
-              <a:t>Current Android version shown</a:t>
-            </a:r>
-            <a:endParaRPr lang="en-US" dirty="0"/>
-          </a:p>
-        </p:txBody>
-      </p:sp>
-      <p:pic>
-        <p:nvPicPr>
-          <p:cNvPr id="6" name="Picture 5"/>
-          <p:cNvPicPr>
-            <a:picLocks noChangeAspect="1"/>
-          </p:cNvPicPr>
-          <p:nvPr/>
-        </p:nvPicPr>
-        <p:blipFill>
-          <a:blip r:embed="rId3"/>
-          <a:stretch>
-            <a:fillRect/>
-          </a:stretch>
-        </p:blipFill>
-        <p:spPr>
-          <a:xfrm>
-            <a:off x="5957577" y="2160897"/>
-            <a:ext cx="2552700" cy="4114800"/>
-          </a:xfrm>
-          <a:prstGeom prst="rect">
-            <a:avLst/>
-          </a:prstGeom>
-        </p:spPr>
-      </p:pic>
-    </p:spTree>
-  </p:cSld>
-  <p:clrMapOvr>
-    <a:masterClrMapping/>
-  </p:clrMapOvr>
-  <p:timing>
-    <p:tnLst>
-      <p:par>
-        <p:cTn id="1" dur="indefinite" restart="never" nodeType="tmRoot"/>
-      </p:par>
-    </p:tnLst>
-  </p:timing>
-</p:sld>
-</file>
-
-<file path=ppt/slides/slide7.xml><?xml version="1.0" encoding="utf-8"?>
-<p:sld xmlns:a="http://schemas.openxmlformats.org/drawingml/2006/main" xmlns:r="http://schemas.openxmlformats.org/officeDocument/2006/relationships" xmlns:p="http://schemas.openxmlformats.org/presentationml/2006/main">
-  <p:cSld>
-    <p:spTree>
-      <p:nvGrpSpPr>
-        <p:cNvPr id="1" name=""/>
-        <p:cNvGrpSpPr/>
-        <p:nvPr/>
-      </p:nvGrpSpPr>
-      <p:grpSpPr>
-        <a:xfrm>
-          <a:off x="0" y="0"/>
-          <a:ext cx="0" cy="0"/>
-          <a:chOff x="0" y="0"/>
-          <a:chExt cx="0" cy="0"/>
-        </a:xfrm>
-      </p:grpSpPr>
-      <p:sp>
-        <p:nvSpPr>
-          <p:cNvPr id="2" name="Title 1"/>
-          <p:cNvSpPr>
-            <a:spLocks noGrp="1"/>
-          </p:cNvSpPr>
-          <p:nvPr>
-            <p:ph type="title"/>
-          </p:nvPr>
-        </p:nvSpPr>
-        <p:spPr>
-          <a:xfrm>
-            <a:off x="744955" y="609600"/>
-            <a:ext cx="7765322" cy="970450"/>
-          </a:xfrm>
-        </p:spPr>
-        <p:txBody>
-          <a:bodyPr>
-            <a:normAutofit/>
-          </a:bodyPr>
-          <a:lstStyle/>
-          <a:p>
-            <a:r>
-              <a:rPr lang="en-US" b="1" dirty="0" smtClean="0"/>
-              <a:t>UC: </a:t>
-            </a:r>
-            <a:endParaRPr lang="en-US" b="1" dirty="0"/>
-          </a:p>
-        </p:txBody>
-      </p:sp>
-      <p:sp>
-        <p:nvSpPr>
-          <p:cNvPr id="3" name="Content Placeholder 2"/>
-          <p:cNvSpPr>
-            <a:spLocks noGrp="1"/>
-          </p:cNvSpPr>
-          <p:nvPr>
-            <p:ph idx="1"/>
-          </p:nvPr>
-        </p:nvSpPr>
-        <p:spPr/>
-        <p:txBody>
-          <a:bodyPr/>
-          <a:lstStyle/>
-          <a:p>
-            <a:pPr>
-              <a:buNone/>
-            </a:pPr>
-            <a:endParaRPr lang="en-US" dirty="0" smtClean="0"/>
-          </a:p>
-          <a:p>
-            <a:pPr>
-              <a:buNone/>
-            </a:pPr>
-            <a:endParaRPr lang="en-US" dirty="0" smtClean="0"/>
-          </a:p>
-          <a:p>
-            <a:pPr>
-              <a:buNone/>
-            </a:pPr>
-            <a:endParaRPr lang="en-US" dirty="0"/>
-          </a:p>
-        </p:txBody>
-      </p:sp>
-      <p:sp>
-        <p:nvSpPr>
-          <p:cNvPr id="5" name="TextBox 4"/>
-          <p:cNvSpPr txBox="1"/>
-          <p:nvPr/>
-        </p:nvSpPr>
-        <p:spPr>
-          <a:xfrm>
-            <a:off x="228601" y="1935480"/>
-            <a:ext cx="4800600" cy="754053"/>
-          </a:xfrm>
-          <a:prstGeom prst="rect">
-            <a:avLst/>
-          </a:prstGeom>
-          <a:noFill/>
-        </p:spPr>
-        <p:txBody>
-          <a:bodyPr wrap="square" rtlCol="0">
-            <a:spAutoFit/>
-          </a:bodyPr>
-          <a:lstStyle/>
+              <a:t>UC:1 Walk in the work place, get auto logged in by detection of their GPS coordinates</a:t>
+            </a:r>
+          </a:p>
           <a:p>
             <a:pPr marL="342900" indent="-306000" defTabSz="457200">
               <a:spcBef>
@@ -8611,7 +9342,7 @@
               <a:buChar char=""/>
             </a:pPr>
             <a:r>
-              <a:rPr lang="en-US" sz="2000" dirty="0">
+              <a:rPr lang="en-US" sz="2200" dirty="0" smtClean="0">
                 <a:ln>
                   <a:solidFill>
                     <a:schemeClr val="bg1">
@@ -8632,79 +9363,118 @@
                   </a:outerShdw>
                 </a:effectLst>
               </a:rPr>
-              <a:t>At </a:t>
-            </a:r>
+              <a:t>UC:3,4  Leave / return for lunch, auto log in/out</a:t>
+            </a:r>
+          </a:p>
+          <a:p>
+            <a:pPr marL="342900" indent="-306000" defTabSz="457200">
+              <a:spcBef>
+                <a:spcPct val="20000"/>
+              </a:spcBef>
+              <a:spcAft>
+                <a:spcPts val="600"/>
+              </a:spcAft>
+              <a:buClr>
+                <a:schemeClr val="tx2"/>
+              </a:buClr>
+              <a:buSzPct val="70000"/>
+              <a:buFont typeface="Wingdings 2" charset="2"/>
+              <a:buChar char=""/>
+            </a:pPr>
+            <a:r>
+              <a:rPr lang="en-US" sz="2200" dirty="0" smtClean="0">
+                <a:ln>
+                  <a:solidFill>
+                    <a:schemeClr val="bg1">
+                      <a:lumMod val="75000"/>
+                      <a:lumOff val="25000"/>
+                      <a:alpha val="10000"/>
+                    </a:schemeClr>
+                  </a:solidFill>
+                </a:ln>
+                <a:solidFill>
+                  <a:schemeClr val="tx2"/>
+                </a:solidFill>
+                <a:effectLst>
+                  <a:outerShdw blurRad="9525" dist="25400" dir="14640000" algn="tl" rotWithShape="0">
+                    <a:schemeClr val="bg1">
+                      <a:alpha val="30000"/>
+                    </a:schemeClr>
+                  </a:outerShdw>
+                </a:effectLst>
+              </a:rPr>
+              <a:t>UC:2 Leave for the day, auto logout</a:t>
+            </a:r>
+          </a:p>
+          <a:p>
+            <a:pPr marL="36900" defTabSz="457200">
+              <a:spcBef>
+                <a:spcPct val="20000"/>
+              </a:spcBef>
+              <a:spcAft>
+                <a:spcPts val="600"/>
+              </a:spcAft>
+              <a:buClr>
+                <a:schemeClr val="tx2"/>
+              </a:buClr>
+              <a:buSzPct val="70000"/>
+            </a:pPr>
+            <a:r>
+              <a:rPr lang="en-US" sz="2200" dirty="0" smtClean="0">
+                <a:ln>
+                  <a:solidFill>
+                    <a:schemeClr val="bg1">
+                      <a:lumMod val="75000"/>
+                      <a:lumOff val="25000"/>
+                      <a:alpha val="10000"/>
+                    </a:schemeClr>
+                  </a:solidFill>
+                </a:ln>
+                <a:solidFill>
+                  <a:schemeClr val="tx2"/>
+                </a:solidFill>
+                <a:effectLst>
+                  <a:outerShdw blurRad="9525" dist="25400" dir="14640000" algn="tl" rotWithShape="0">
+                    <a:schemeClr val="bg1">
+                      <a:alpha val="30000"/>
+                    </a:schemeClr>
+                  </a:outerShdw>
+                </a:effectLst>
+              </a:rPr>
+              <a:t>Output: Employee is notified by a tone/visual </a:t>
+            </a:r>
+            <a:endParaRPr lang="en-US" sz="2200" dirty="0">
+              <a:ln>
+                <a:solidFill>
+                  <a:schemeClr val="bg1">
+                    <a:lumMod val="75000"/>
+                    <a:lumOff val="25000"/>
+                    <a:alpha val="10000"/>
+                  </a:schemeClr>
+                </a:solidFill>
+              </a:ln>
+              <a:solidFill>
+                <a:schemeClr val="tx2"/>
+              </a:solidFill>
+              <a:effectLst>
+                <a:outerShdw blurRad="9525" dist="25400" dir="14640000" algn="tl" rotWithShape="0">
+                  <a:schemeClr val="bg1">
+                    <a:alpha val="30000"/>
+                  </a:schemeClr>
+                </a:outerShdw>
+              </a:effectLst>
+            </a:endParaRPr>
           </a:p>
           <a:p>
             <a:pPr marL="285750" indent="-285750">
               <a:buFont typeface="Arial" panose="020B0604020202020204" pitchFamily="34" charset="0"/>
               <a:buChar char="•"/>
             </a:pPr>
-            <a:endParaRPr lang="en-US" dirty="0"/>
-          </a:p>
-        </p:txBody>
-      </p:sp>
-      <p:sp>
-        <p:nvSpPr>
-          <p:cNvPr id="8" name="TextBox 7"/>
-          <p:cNvSpPr txBox="1"/>
-          <p:nvPr/>
-        </p:nvSpPr>
-        <p:spPr>
-          <a:xfrm>
-            <a:off x="5714999" y="6275697"/>
-            <a:ext cx="2828925" cy="646331"/>
-          </a:xfrm>
-          <a:prstGeom prst="rect">
-            <a:avLst/>
-          </a:prstGeom>
-          <a:noFill/>
-        </p:spPr>
-        <p:txBody>
-          <a:bodyPr wrap="square" rtlCol="0">
-            <a:spAutoFit/>
-          </a:bodyPr>
-          <a:lstStyle/>
-          <a:p>
-            <a:pPr algn="ctr"/>
-            <a:r>
-              <a:rPr lang="en-US" dirty="0" smtClean="0"/>
-              <a:t>Current Android version shown</a:t>
-            </a:r>
-            <a:endParaRPr lang="en-US" dirty="0"/>
-          </a:p>
-        </p:txBody>
-      </p:sp>
-      <p:pic>
-        <p:nvPicPr>
-          <p:cNvPr id="6" name="Picture 5"/>
-          <p:cNvPicPr>
-            <a:picLocks noChangeAspect="1"/>
-          </p:cNvPicPr>
-          <p:nvPr/>
-        </p:nvPicPr>
-        <p:blipFill>
-          <a:blip r:embed="rId3"/>
-          <a:stretch>
-            <a:fillRect/>
-          </a:stretch>
-        </p:blipFill>
-        <p:spPr>
-          <a:xfrm>
-            <a:off x="5957577" y="2160897"/>
-            <a:ext cx="2552700" cy="4114800"/>
-          </a:xfrm>
-          <a:prstGeom prst="rect">
-            <a:avLst/>
-          </a:prstGeom>
-        </p:spPr>
-      </p:pic>
+            <a:endParaRPr lang="en-US" sz="2200" dirty="0"/>
+          </a:p>
+        </p:txBody>
+      </p:sp>
     </p:spTree>
-    <p:extLst>
-      <p:ext uri="{BB962C8B-B14F-4D97-AF65-F5344CB8AC3E}">
-        <p14:creationId xmlns:p14="http://schemas.microsoft.com/office/powerpoint/2010/main" val="632186089"/>
-      </p:ext>
-    </p:extLst>
   </p:cSld>
   <p:clrMapOvr>
     <a:masterClrMapping/>
@@ -8746,23 +9516,16 @@
             <p:ph type="title"/>
           </p:nvPr>
         </p:nvSpPr>
-        <p:spPr>
-          <a:xfrm>
-            <a:off x="744955" y="609600"/>
-            <a:ext cx="7765322" cy="970450"/>
-          </a:xfrm>
-        </p:spPr>
-        <p:txBody>
-          <a:bodyPr>
-            <a:normAutofit/>
-          </a:bodyPr>
-          <a:lstStyle/>
-          <a:p>
-            <a:r>
-              <a:rPr lang="en-US" b="1" dirty="0" smtClean="0"/>
-              <a:t>UC: </a:t>
-            </a:r>
-            <a:endParaRPr lang="en-US" b="1" dirty="0"/>
+        <p:spPr/>
+        <p:txBody>
+          <a:bodyPr/>
+          <a:lstStyle/>
+          <a:p>
+            <a:r>
+              <a:rPr lang="en-US" dirty="0" smtClean="0"/>
+              <a:t>GPS Service class </a:t>
+            </a:r>
+            <a:endParaRPr lang="en-US" dirty="0"/>
           </a:p>
         </p:txBody>
       </p:sp>
@@ -8781,167 +9544,24 @@
           <a:bodyPr/>
           <a:lstStyle/>
           <a:p>
-            <a:pPr>
-              <a:buNone/>
-            </a:pPr>
-            <a:endParaRPr lang="en-US" dirty="0" smtClean="0"/>
-          </a:p>
-          <a:p>
-            <a:pPr>
-              <a:buNone/>
-            </a:pPr>
-            <a:endParaRPr lang="en-US" dirty="0" smtClean="0"/>
-          </a:p>
-          <a:p>
-            <a:pPr>
-              <a:buNone/>
-            </a:pPr>
+            <a:r>
+              <a:rPr lang="en-US" dirty="0" smtClean="0"/>
+              <a:t>David, explain functions in GPS service and how we hook it to app</a:t>
+            </a:r>
             <a:endParaRPr lang="en-US" dirty="0"/>
           </a:p>
         </p:txBody>
       </p:sp>
-      <p:sp>
-        <p:nvSpPr>
-          <p:cNvPr id="5" name="TextBox 4"/>
-          <p:cNvSpPr txBox="1"/>
-          <p:nvPr/>
-        </p:nvSpPr>
-        <p:spPr>
-          <a:xfrm>
-            <a:off x="228601" y="1935480"/>
-            <a:ext cx="4800600" cy="754053"/>
-          </a:xfrm>
-          <a:prstGeom prst="rect">
-            <a:avLst/>
-          </a:prstGeom>
-          <a:noFill/>
-        </p:spPr>
-        <p:txBody>
-          <a:bodyPr wrap="square" rtlCol="0">
-            <a:spAutoFit/>
-          </a:bodyPr>
-          <a:lstStyle/>
-          <a:p>
-            <a:pPr marL="342900" indent="-306000" defTabSz="457200">
-              <a:spcBef>
-                <a:spcPct val="20000"/>
-              </a:spcBef>
-              <a:spcAft>
-                <a:spcPts val="600"/>
-              </a:spcAft>
-              <a:buClr>
-                <a:schemeClr val="tx2"/>
-              </a:buClr>
-              <a:buSzPct val="70000"/>
-              <a:buFont typeface="Wingdings 2" charset="2"/>
-              <a:buChar char=""/>
-            </a:pPr>
-            <a:r>
-              <a:rPr lang="en-US" sz="2000" dirty="0">
-                <a:ln>
-                  <a:solidFill>
-                    <a:schemeClr val="bg1">
-                      <a:lumMod val="75000"/>
-                      <a:lumOff val="25000"/>
-                      <a:alpha val="10000"/>
-                    </a:schemeClr>
-                  </a:solidFill>
-                </a:ln>
-                <a:solidFill>
-                  <a:schemeClr val="tx2"/>
-                </a:solidFill>
-                <a:effectLst>
-                  <a:outerShdw blurRad="9525" dist="25400" dir="14640000" algn="tl" rotWithShape="0">
-                    <a:schemeClr val="bg1">
-                      <a:alpha val="30000"/>
-                    </a:schemeClr>
-                  </a:outerShdw>
-                </a:effectLst>
-              </a:rPr>
-              <a:t>At </a:t>
-            </a:r>
-          </a:p>
-          <a:p>
-            <a:pPr marL="285750" indent="-285750">
-              <a:buFont typeface="Arial" panose="020B0604020202020204" pitchFamily="34" charset="0"/>
-              <a:buChar char="•"/>
-            </a:pPr>
-            <a:endParaRPr lang="en-US" dirty="0"/>
-          </a:p>
-        </p:txBody>
-      </p:sp>
-      <p:sp>
-        <p:nvSpPr>
-          <p:cNvPr id="8" name="TextBox 7"/>
-          <p:cNvSpPr txBox="1"/>
-          <p:nvPr/>
-        </p:nvSpPr>
-        <p:spPr>
-          <a:xfrm>
-            <a:off x="5714999" y="6275697"/>
-            <a:ext cx="2828925" cy="646331"/>
-          </a:xfrm>
-          <a:prstGeom prst="rect">
-            <a:avLst/>
-          </a:prstGeom>
-          <a:noFill/>
-        </p:spPr>
-        <p:txBody>
-          <a:bodyPr wrap="square" rtlCol="0">
-            <a:spAutoFit/>
-          </a:bodyPr>
-          <a:lstStyle/>
-          <a:p>
-            <a:pPr algn="ctr"/>
-            <a:r>
-              <a:rPr lang="en-US" dirty="0" smtClean="0"/>
-              <a:t>Current Android version shown</a:t>
-            </a:r>
-            <a:endParaRPr lang="en-US" dirty="0"/>
-          </a:p>
-        </p:txBody>
-      </p:sp>
-      <p:pic>
-        <p:nvPicPr>
-          <p:cNvPr id="6" name="Picture 5"/>
-          <p:cNvPicPr>
-            <a:picLocks noChangeAspect="1"/>
-          </p:cNvPicPr>
-          <p:nvPr/>
-        </p:nvPicPr>
-        <p:blipFill>
-          <a:blip r:embed="rId3"/>
-          <a:stretch>
-            <a:fillRect/>
-          </a:stretch>
-        </p:blipFill>
-        <p:spPr>
-          <a:xfrm>
-            <a:off x="5957577" y="2160897"/>
-            <a:ext cx="2552700" cy="4114800"/>
-          </a:xfrm>
-          <a:prstGeom prst="rect">
-            <a:avLst/>
-          </a:prstGeom>
-        </p:spPr>
-      </p:pic>
     </p:spTree>
     <p:extLst>
       <p:ext uri="{BB962C8B-B14F-4D97-AF65-F5344CB8AC3E}">
-        <p14:creationId xmlns:p14="http://schemas.microsoft.com/office/powerpoint/2010/main" val="2542402137"/>
+        <p14:creationId xmlns:p14="http://schemas.microsoft.com/office/powerpoint/2010/main" val="680023946"/>
       </p:ext>
     </p:extLst>
   </p:cSld>
   <p:clrMapOvr>
     <a:masterClrMapping/>
   </p:clrMapOvr>
-  <p:timing>
-    <p:tnLst>
-      <p:par>
-        <p:cTn id="1" dur="indefinite" restart="never" nodeType="tmRoot"/>
-      </p:par>
-    </p:tnLst>
-  </p:timing>
 </p:sld>
 </file>
 
@@ -8972,23 +9592,21 @@
             <p:ph type="title"/>
           </p:nvPr>
         </p:nvSpPr>
-        <p:spPr>
-          <a:xfrm>
-            <a:off x="744955" y="609600"/>
-            <a:ext cx="7765322" cy="970450"/>
-          </a:xfrm>
-        </p:spPr>
+        <p:spPr/>
         <p:txBody>
           <a:bodyPr>
-            <a:normAutofit/>
+            <a:normAutofit fontScale="90000"/>
           </a:bodyPr>
           <a:lstStyle/>
           <a:p>
             <a:r>
-              <a:rPr lang="en-US" b="1" dirty="0" smtClean="0"/>
-              <a:t>UC: </a:t>
-            </a:r>
-            <a:endParaRPr lang="en-US" b="1" dirty="0"/>
+              <a:rPr lang="en-US" dirty="0"/>
+              <a:t>David: Relation between </a:t>
+            </a:r>
+            <a:br>
+              <a:rPr lang="en-US" dirty="0"/>
+            </a:br>
+            <a:endParaRPr lang="en-US" dirty="0"/>
           </a:p>
         </p:txBody>
       </p:sp>
@@ -9007,167 +9625,51 @@
           <a:bodyPr/>
           <a:lstStyle/>
           <a:p>
-            <a:pPr>
-              <a:buNone/>
-            </a:pPr>
-            <a:endParaRPr lang="en-US" dirty="0" smtClean="0"/>
-          </a:p>
-          <a:p>
-            <a:pPr>
-              <a:buNone/>
-            </a:pPr>
-            <a:endParaRPr lang="en-US" dirty="0" smtClean="0"/>
-          </a:p>
-          <a:p>
-            <a:pPr>
-              <a:buNone/>
-            </a:pPr>
+            <a:r>
+              <a:rPr lang="en-US" dirty="0"/>
+              <a:t>David: Relation between </a:t>
+            </a:r>
+          </a:p>
+          <a:p>
+            <a:r>
+              <a:rPr lang="en-US" dirty="0"/>
+              <a:t>&lt;app&gt; </a:t>
+            </a:r>
+            <a:r>
+              <a:rPr lang="en-US" dirty="0">
+                <a:sym typeface="Wingdings" panose="05000000000000000000" pitchFamily="2" charset="2"/>
+              </a:rPr>
+              <a:t> &lt;transporter&gt; &lt;GPS service&gt; &lt;</a:t>
+            </a:r>
+            <a:r>
+              <a:rPr lang="en-US" dirty="0" err="1">
+                <a:sym typeface="Wingdings" panose="05000000000000000000" pitchFamily="2" charset="2"/>
+              </a:rPr>
+              <a:t>Api</a:t>
+            </a:r>
+            <a:r>
+              <a:rPr lang="en-US" dirty="0">
+                <a:sym typeface="Wingdings" panose="05000000000000000000" pitchFamily="2" charset="2"/>
+              </a:rPr>
+              <a:t>&gt; </a:t>
+            </a:r>
             <a:endParaRPr lang="en-US" dirty="0"/>
           </a:p>
-        </p:txBody>
-      </p:sp>
-      <p:sp>
-        <p:nvSpPr>
-          <p:cNvPr id="5" name="TextBox 4"/>
-          <p:cNvSpPr txBox="1"/>
-          <p:nvPr/>
-        </p:nvSpPr>
-        <p:spPr>
-          <a:xfrm>
-            <a:off x="228601" y="1935480"/>
-            <a:ext cx="4800600" cy="754053"/>
-          </a:xfrm>
-          <a:prstGeom prst="rect">
-            <a:avLst/>
-          </a:prstGeom>
-          <a:noFill/>
-        </p:spPr>
-        <p:txBody>
-          <a:bodyPr wrap="square" rtlCol="0">
-            <a:spAutoFit/>
-          </a:bodyPr>
-          <a:lstStyle/>
-          <a:p>
-            <a:pPr marL="342900" indent="-306000" defTabSz="457200">
-              <a:spcBef>
-                <a:spcPct val="20000"/>
-              </a:spcBef>
-              <a:spcAft>
-                <a:spcPts val="600"/>
-              </a:spcAft>
-              <a:buClr>
-                <a:schemeClr val="tx2"/>
-              </a:buClr>
-              <a:buSzPct val="70000"/>
-              <a:buFont typeface="Wingdings 2" charset="2"/>
-              <a:buChar char=""/>
-            </a:pPr>
-            <a:r>
-              <a:rPr lang="en-US" sz="2000" dirty="0">
-                <a:ln>
-                  <a:solidFill>
-                    <a:schemeClr val="bg1">
-                      <a:lumMod val="75000"/>
-                      <a:lumOff val="25000"/>
-                      <a:alpha val="10000"/>
-                    </a:schemeClr>
-                  </a:solidFill>
-                </a:ln>
-                <a:solidFill>
-                  <a:schemeClr val="tx2"/>
-                </a:solidFill>
-                <a:effectLst>
-                  <a:outerShdw blurRad="9525" dist="25400" dir="14640000" algn="tl" rotWithShape="0">
-                    <a:schemeClr val="bg1">
-                      <a:alpha val="30000"/>
-                    </a:schemeClr>
-                  </a:outerShdw>
-                </a:effectLst>
-              </a:rPr>
-              <a:t>At </a:t>
-            </a:r>
-          </a:p>
-          <a:p>
-            <a:pPr marL="285750" indent="-285750">
-              <a:buFont typeface="Arial" panose="020B0604020202020204" pitchFamily="34" charset="0"/>
-              <a:buChar char="•"/>
-            </a:pPr>
+          <a:p>
             <a:endParaRPr lang="en-US" dirty="0"/>
           </a:p>
         </p:txBody>
       </p:sp>
-      <p:sp>
-        <p:nvSpPr>
-          <p:cNvPr id="8" name="TextBox 7"/>
-          <p:cNvSpPr txBox="1"/>
-          <p:nvPr/>
-        </p:nvSpPr>
-        <p:spPr>
-          <a:xfrm>
-            <a:off x="5714999" y="6275697"/>
-            <a:ext cx="2828925" cy="646331"/>
-          </a:xfrm>
-          <a:prstGeom prst="rect">
-            <a:avLst/>
-          </a:prstGeom>
-          <a:noFill/>
-        </p:spPr>
-        <p:txBody>
-          <a:bodyPr wrap="square" rtlCol="0">
-            <a:spAutoFit/>
-          </a:bodyPr>
-          <a:lstStyle/>
-          <a:p>
-            <a:pPr algn="ctr"/>
-            <a:r>
-              <a:rPr lang="en-US" dirty="0" smtClean="0"/>
-              <a:t>Current Android version shown</a:t>
-            </a:r>
-            <a:endParaRPr lang="en-US" dirty="0"/>
-          </a:p>
-        </p:txBody>
-      </p:sp>
-      <p:pic>
-        <p:nvPicPr>
-          <p:cNvPr id="6" name="Picture 5"/>
-          <p:cNvPicPr>
-            <a:picLocks noChangeAspect="1"/>
-          </p:cNvPicPr>
-          <p:nvPr/>
-        </p:nvPicPr>
-        <p:blipFill>
-          <a:blip r:embed="rId3"/>
-          <a:stretch>
-            <a:fillRect/>
-          </a:stretch>
-        </p:blipFill>
-        <p:spPr>
-          <a:xfrm>
-            <a:off x="5957577" y="2160897"/>
-            <a:ext cx="2552700" cy="4114800"/>
-          </a:xfrm>
-          <a:prstGeom prst="rect">
-            <a:avLst/>
-          </a:prstGeom>
-        </p:spPr>
-      </p:pic>
     </p:spTree>
     <p:extLst>
       <p:ext uri="{BB962C8B-B14F-4D97-AF65-F5344CB8AC3E}">
-        <p14:creationId xmlns:p14="http://schemas.microsoft.com/office/powerpoint/2010/main" val="2145517465"/>
+        <p14:creationId xmlns:p14="http://schemas.microsoft.com/office/powerpoint/2010/main" val="2503995030"/>
       </p:ext>
     </p:extLst>
   </p:cSld>
   <p:clrMapOvr>
     <a:masterClrMapping/>
   </p:clrMapOvr>
-  <p:timing>
-    <p:tnLst>
-      <p:par>
-        <p:cTn id="1" dur="indefinite" restart="never" nodeType="tmRoot"/>
-      </p:par>
-    </p:tnLst>
-  </p:timing>
 </p:sld>
 </file>
 
@@ -9408,8 +9910,9 @@
       <a:spPr>
         <a:ln w="76200">
           <a:solidFill>
-            <a:srgbClr val="FFFF00"/>
+            <a:srgbClr val="FFC000"/>
           </a:solidFill>
+          <a:tailEnd type="triangle"/>
         </a:ln>
       </a:spPr>
       <a:bodyPr/>

</xml_diff>

<commit_message>
clock updated and webpage link updated
</commit_message>
<xml_diff>
--- a/MobAppFinalPresent.pptx
+++ b/MobAppFinalPresent.pptx
@@ -125,7 +125,7 @@
   </p:defaultTextStyle>
   <p:extLst>
     <p:ext uri="{EFAFB233-063F-42B5-8137-9DF3F51BA10A}">
-      <p15:sldGuideLst xmlns:p15="http://schemas.microsoft.com/office/powerpoint/2012/main" xmlns="">
+      <p15:sldGuideLst xmlns:p15="http://schemas.microsoft.com/office/powerpoint/2012/main">
         <p15:guide id="1" orient="horz" pos="2160">
           <p15:clr>
             <a:srgbClr val="A4A3A4"/>
@@ -6947,7 +6947,7 @@
         </p:nvSpPr>
         <p:spPr>
           <a:xfrm>
-            <a:off x="111229" y="562440"/>
+            <a:off x="228600" y="328652"/>
             <a:ext cx="7765322" cy="970450"/>
           </a:xfrm>
         </p:spPr>
@@ -7007,8 +7007,8 @@
         </p:nvSpPr>
         <p:spPr>
           <a:xfrm>
-            <a:off x="228601" y="1935480"/>
-            <a:ext cx="4800600" cy="1954381"/>
+            <a:off x="470659" y="1299102"/>
+            <a:ext cx="4800600" cy="2828467"/>
           </a:xfrm>
           <a:prstGeom prst="rect">
             <a:avLst/>
@@ -7036,7 +7036,7 @@
               <a:buChar char=""/>
             </a:pPr>
             <a:r>
-              <a:rPr lang="en-US" sz="2000" dirty="0" smtClean="0">
+              <a:rPr lang="en-US" sz="2200" dirty="0" smtClean="0">
                 <a:ln>
                   <a:solidFill>
                     <a:schemeClr val="bg1">
@@ -7076,7 +7076,7 @@
               <a:buChar char=""/>
             </a:pPr>
             <a:r>
-              <a:rPr lang="en-US" sz="2000" dirty="0" smtClean="0">
+              <a:rPr lang="en-US" sz="2200" dirty="0" smtClean="0">
                 <a:ln>
                   <a:solidFill>
                     <a:schemeClr val="bg1">
@@ -7114,7 +7114,7 @@
               <a:buSzPct val="70000"/>
             </a:pPr>
             <a:r>
-              <a:rPr lang="en-US" sz="2000" dirty="0" smtClean="0">
+              <a:rPr lang="en-US" sz="2200" dirty="0" smtClean="0">
                 <a:ln>
                   <a:solidFill>
                     <a:schemeClr val="bg1">
@@ -7137,7 +7137,7 @@
               </a:rPr>
               <a:t>Using: Database connection</a:t>
             </a:r>
-            <a:endParaRPr lang="en-US" sz="2000" dirty="0">
+            <a:endParaRPr lang="en-US" sz="2200" dirty="0">
               <a:ln>
                 <a:solidFill>
                   <a:schemeClr val="bg1">
@@ -7164,7 +7164,7 @@
               <a:buFont typeface="Arial" panose="020B0604020202020204" pitchFamily="34" charset="0"/>
               <a:buChar char="•"/>
             </a:pPr>
-            <a:endParaRPr lang="en-US" dirty="0"/>
+            <a:endParaRPr lang="en-US" sz="2200" dirty="0"/>
           </a:p>
         </p:txBody>
       </p:sp>
@@ -7280,7 +7280,7 @@
         </p:blipFill>
         <p:spPr>
           <a:xfrm>
-            <a:off x="416928" y="3681159"/>
+            <a:off x="522364" y="3889861"/>
             <a:ext cx="1738205" cy="2968139"/>
           </a:xfrm>
           <a:prstGeom prst="rect">
@@ -7296,7 +7296,7 @@
         </p:nvSpPr>
         <p:spPr>
           <a:xfrm>
-            <a:off x="833118" y="5762161"/>
+            <a:off x="904295" y="5988936"/>
             <a:ext cx="229054" cy="228600"/>
           </a:xfrm>
           <a:prstGeom prst="ellipse">
@@ -7469,7 +7469,7 @@
         </p:blipFill>
         <p:spPr>
           <a:xfrm>
-            <a:off x="2895600" y="2822972"/>
+            <a:off x="3124200" y="2819400"/>
             <a:ext cx="2271605" cy="3878967"/>
           </a:xfrm>
           <a:prstGeom prst="rect">
@@ -7485,7 +7485,47 @@
         </p:nvSpPr>
         <p:spPr>
           <a:xfrm>
-            <a:off x="3505200" y="5105400"/>
+            <a:off x="3581400" y="5105400"/>
+            <a:ext cx="229054" cy="228600"/>
+          </a:xfrm>
+          <a:prstGeom prst="ellipse">
+            <a:avLst/>
+          </a:prstGeom>
+        </p:spPr>
+        <p:style>
+          <a:lnRef idx="2">
+            <a:schemeClr val="accent1">
+              <a:shade val="50000"/>
+            </a:schemeClr>
+          </a:lnRef>
+          <a:fillRef idx="1">
+            <a:schemeClr val="accent1"/>
+          </a:fillRef>
+          <a:effectRef idx="0">
+            <a:schemeClr val="accent1"/>
+          </a:effectRef>
+          <a:fontRef idx="minor">
+            <a:schemeClr val="lt1"/>
+          </a:fontRef>
+        </p:style>
+        <p:txBody>
+          <a:bodyPr rtlCol="0" anchor="ctr"/>
+          <a:lstStyle/>
+          <a:p>
+            <a:pPr algn="ctr"/>
+            <a:endParaRPr lang="en-US"/>
+          </a:p>
+        </p:txBody>
+      </p:sp>
+      <p:sp>
+        <p:nvSpPr>
+          <p:cNvPr id="9" name="Oval 8"/>
+          <p:cNvSpPr/>
+          <p:nvPr/>
+        </p:nvSpPr>
+        <p:spPr>
+          <a:xfrm>
+            <a:off x="6579655" y="4419600"/>
             <a:ext cx="229054" cy="228600"/>
           </a:xfrm>
           <a:prstGeom prst="ellipse">
@@ -7562,7 +7602,11 @@
           <a:bodyPr/>
           <a:lstStyle/>
           <a:p>
-            <a:endParaRPr lang="en-US"/>
+            <a:r>
+              <a:rPr lang="en-US" dirty="0" smtClean="0"/>
+              <a:t>UC:7 </a:t>
+            </a:r>
+            <a:endParaRPr lang="en-US" dirty="0"/>
           </a:p>
         </p:txBody>
       </p:sp>
@@ -7578,14 +7622,16 @@
         </p:nvSpPr>
         <p:spPr/>
         <p:txBody>
-          <a:bodyPr/>
-          <a:lstStyle/>
-          <a:p>
-            <a:r>
-              <a:rPr lang="en-US" dirty="0" smtClean="0"/>
+          <a:bodyPr>
+            <a:normAutofit/>
+          </a:bodyPr>
+          <a:lstStyle/>
+          <a:p>
+            <a:r>
+              <a:rPr lang="en-US" sz="2500" dirty="0" smtClean="0"/>
               <a:t>Employee views schedule </a:t>
             </a:r>
-            <a:endParaRPr lang="en-US" dirty="0"/>
+            <a:endParaRPr lang="en-US" sz="2500" dirty="0"/>
           </a:p>
         </p:txBody>
       </p:sp>
@@ -7782,16 +7828,27 @@
             <p:ph idx="1"/>
           </p:nvPr>
         </p:nvSpPr>
-        <p:spPr/>
-        <p:txBody>
-          <a:bodyPr/>
-          <a:lstStyle/>
-          <a:p>
-            <a:r>
-              <a:rPr lang="en-US" dirty="0" smtClean="0"/>
-              <a:t>Employee sets alarms </a:t>
-            </a:r>
-            <a:endParaRPr lang="en-US" dirty="0"/>
+        <p:spPr>
+          <a:xfrm>
+            <a:off x="-152400" y="2081892"/>
+            <a:ext cx="7765322" cy="4058751"/>
+          </a:xfrm>
+        </p:spPr>
+        <p:txBody>
+          <a:bodyPr>
+            <a:normAutofit/>
+          </a:bodyPr>
+          <a:lstStyle/>
+          <a:p>
+            <a:r>
+              <a:rPr lang="en-US" sz="2200" dirty="0" smtClean="0"/>
+              <a:t>Employee sets </a:t>
+            </a:r>
+            <a:r>
+              <a:rPr lang="en-US" sz="2200" dirty="0" smtClean="0"/>
+              <a:t>alarms for the reminder of the shift time </a:t>
+            </a:r>
+            <a:endParaRPr lang="en-US" sz="2200" dirty="0"/>
           </a:p>
         </p:txBody>
       </p:sp>
@@ -7865,6 +7922,209 @@
           </a:p>
         </p:txBody>
       </p:sp>
+      <p:pic>
+        <p:nvPicPr>
+          <p:cNvPr id="7" name="Picture 6" descr="Screen Clipping"/>
+          <p:cNvPicPr>
+            <a:picLocks noChangeAspect="1"/>
+          </p:cNvPicPr>
+          <p:nvPr/>
+        </p:nvPicPr>
+        <p:blipFill>
+          <a:blip r:embed="rId3" cstate="print">
+            <a:extLst>
+              <a:ext uri="{28A0092B-C50C-407E-A947-70E740481C1C}">
+                <a14:useLocalDpi xmlns:a14="http://schemas.microsoft.com/office/drawing/2010/main" val="0"/>
+              </a:ext>
+            </a:extLst>
+          </a:blip>
+          <a:stretch>
+            <a:fillRect/>
+          </a:stretch>
+        </p:blipFill>
+        <p:spPr>
+          <a:xfrm>
+            <a:off x="2689185" y="2990851"/>
+            <a:ext cx="1876645" cy="3048000"/>
+          </a:xfrm>
+          <a:prstGeom prst="rect">
+            <a:avLst/>
+          </a:prstGeom>
+        </p:spPr>
+      </p:pic>
+      <p:pic>
+        <p:nvPicPr>
+          <p:cNvPr id="9" name="Picture 8" descr="Screen Clipping"/>
+          <p:cNvPicPr>
+            <a:picLocks noChangeAspect="1"/>
+          </p:cNvPicPr>
+          <p:nvPr/>
+        </p:nvPicPr>
+        <p:blipFill>
+          <a:blip r:embed="rId4">
+            <a:extLst>
+              <a:ext uri="{28A0092B-C50C-407E-A947-70E740481C1C}">
+                <a14:useLocalDpi xmlns:a14="http://schemas.microsoft.com/office/drawing/2010/main" val="0"/>
+              </a:ext>
+            </a:extLst>
+          </a:blip>
+          <a:stretch>
+            <a:fillRect/>
+          </a:stretch>
+        </p:blipFill>
+        <p:spPr>
+          <a:xfrm>
+            <a:off x="4857760" y="3332821"/>
+            <a:ext cx="2000239" cy="3270368"/>
+          </a:xfrm>
+          <a:prstGeom prst="rect">
+            <a:avLst/>
+          </a:prstGeom>
+        </p:spPr>
+      </p:pic>
+      <p:sp>
+        <p:nvSpPr>
+          <p:cNvPr id="10" name="Oval 9"/>
+          <p:cNvSpPr/>
+          <p:nvPr/>
+        </p:nvSpPr>
+        <p:spPr>
+          <a:xfrm>
+            <a:off x="5638800" y="6172200"/>
+            <a:ext cx="457200" cy="228600"/>
+          </a:xfrm>
+          <a:prstGeom prst="ellipse">
+            <a:avLst/>
+          </a:prstGeom>
+          <a:noFill/>
+        </p:spPr>
+        <p:style>
+          <a:lnRef idx="2">
+            <a:schemeClr val="accent1">
+              <a:shade val="50000"/>
+            </a:schemeClr>
+          </a:lnRef>
+          <a:fillRef idx="1">
+            <a:schemeClr val="accent1"/>
+          </a:fillRef>
+          <a:effectRef idx="0">
+            <a:schemeClr val="accent1"/>
+          </a:effectRef>
+          <a:fontRef idx="minor">
+            <a:schemeClr val="lt1"/>
+          </a:fontRef>
+        </p:style>
+        <p:txBody>
+          <a:bodyPr rtlCol="0" anchor="ctr"/>
+          <a:lstStyle/>
+          <a:p>
+            <a:pPr algn="ctr"/>
+            <a:endParaRPr lang="en-US"/>
+          </a:p>
+        </p:txBody>
+      </p:sp>
+      <p:pic>
+        <p:nvPicPr>
+          <p:cNvPr id="11" name="Picture 10" descr="Screen Clipping"/>
+          <p:cNvPicPr>
+            <a:picLocks noChangeAspect="1"/>
+          </p:cNvPicPr>
+          <p:nvPr/>
+        </p:nvPicPr>
+        <p:blipFill>
+          <a:blip r:embed="rId2" cstate="print">
+            <a:extLst>
+              <a:ext uri="{28A0092B-C50C-407E-A947-70E740481C1C}">
+                <a14:useLocalDpi xmlns:a14="http://schemas.microsoft.com/office/drawing/2010/main" val="0"/>
+              </a:ext>
+            </a:extLst>
+          </a:blip>
+          <a:stretch>
+            <a:fillRect/>
+          </a:stretch>
+        </p:blipFill>
+        <p:spPr>
+          <a:xfrm>
+            <a:off x="7030519" y="1732450"/>
+            <a:ext cx="1738205" cy="2968139"/>
+          </a:xfrm>
+          <a:prstGeom prst="rect">
+            <a:avLst/>
+          </a:prstGeom>
+        </p:spPr>
+      </p:pic>
+      <p:cxnSp>
+        <p:nvCxnSpPr>
+          <p:cNvPr id="13" name="Elbow Connector 12"/>
+          <p:cNvCxnSpPr/>
+          <p:nvPr/>
+        </p:nvCxnSpPr>
+        <p:spPr>
+          <a:xfrm rot="5400000" flipH="1" flipV="1">
+            <a:off x="6506461" y="4944362"/>
+            <a:ext cx="1409700" cy="1274577"/>
+          </a:xfrm>
+          <a:prstGeom prst="bentConnector3">
+            <a:avLst/>
+          </a:prstGeom>
+          <a:ln w="76200">
+            <a:solidFill>
+              <a:srgbClr val="FFC000"/>
+            </a:solidFill>
+            <a:tailEnd type="triangle"/>
+          </a:ln>
+        </p:spPr>
+        <p:style>
+          <a:lnRef idx="1">
+            <a:schemeClr val="accent1"/>
+          </a:lnRef>
+          <a:fillRef idx="0">
+            <a:schemeClr val="accent1"/>
+          </a:fillRef>
+          <a:effectRef idx="0">
+            <a:schemeClr val="accent1"/>
+          </a:effectRef>
+          <a:fontRef idx="minor">
+            <a:schemeClr val="tx1"/>
+          </a:fontRef>
+        </p:style>
+      </p:cxnSp>
+      <p:cxnSp>
+        <p:nvCxnSpPr>
+          <p:cNvPr id="15" name="Elbow Connector 14"/>
+          <p:cNvCxnSpPr/>
+          <p:nvPr/>
+        </p:nvCxnSpPr>
+        <p:spPr>
+          <a:xfrm rot="5400000" flipH="1" flipV="1">
+            <a:off x="6291786" y="2907352"/>
+            <a:ext cx="1066800" cy="890896"/>
+          </a:xfrm>
+          <a:prstGeom prst="bentConnector3">
+            <a:avLst/>
+          </a:prstGeom>
+          <a:ln w="76200">
+            <a:solidFill>
+              <a:srgbClr val="FFC000"/>
+            </a:solidFill>
+            <a:tailEnd type="triangle"/>
+          </a:ln>
+        </p:spPr>
+        <p:style>
+          <a:lnRef idx="1">
+            <a:schemeClr val="accent1"/>
+          </a:lnRef>
+          <a:fillRef idx="0">
+            <a:schemeClr val="accent1"/>
+          </a:fillRef>
+          <a:effectRef idx="0">
+            <a:schemeClr val="accent1"/>
+          </a:effectRef>
+          <a:fontRef idx="minor">
+            <a:schemeClr val="tx1"/>
+          </a:fontRef>
+        </p:style>
+      </p:cxnSp>
     </p:spTree>
     <p:extLst>
       <p:ext uri="{BB962C8B-B14F-4D97-AF65-F5344CB8AC3E}">
@@ -7972,7 +8232,7 @@
         </p:nvSpPr>
         <p:spPr>
           <a:xfrm>
-            <a:off x="228600" y="1935480"/>
+            <a:off x="381000" y="1676400"/>
             <a:ext cx="8610599" cy="3243965"/>
           </a:xfrm>
           <a:prstGeom prst="rect">
@@ -8183,8 +8443,8 @@
         </p:nvSpPr>
         <p:spPr>
           <a:xfrm>
-            <a:off x="1066800" y="5410200"/>
-            <a:ext cx="5791200" cy="507831"/>
+            <a:off x="17516" y="4701468"/>
+            <a:ext cx="9220200" cy="1000274"/>
           </a:xfrm>
           <a:prstGeom prst="rect">
             <a:avLst/>
@@ -8197,15 +8457,34 @@
           </a:bodyPr>
           <a:lstStyle/>
           <a:p>
-            <a:r>
-              <a:rPr lang="en-US" dirty="0" smtClean="0"/>
-              <a:t>Look yourself!:    </a:t>
-            </a:r>
+            <a:endParaRPr lang="en-US" sz="2700" dirty="0"/>
+          </a:p>
+          <a:p>
             <a:r>
               <a:rPr lang="en-US" sz="2700" dirty="0" smtClean="0"/>
-              <a:t>www.group6project.com</a:t>
-            </a:r>
-            <a:endParaRPr lang="en-US" sz="2700" dirty="0"/>
+              <a:t>http</a:t>
+            </a:r>
+            <a:r>
+              <a:rPr lang="en-US" sz="2700" dirty="0"/>
+              <a:t>://</a:t>
+            </a:r>
+            <a:r>
+              <a:rPr lang="en-US" sz="3200" dirty="0">
+                <a:solidFill>
+                  <a:srgbClr val="FFFF00"/>
+                </a:solidFill>
+              </a:rPr>
+              <a:t>group6project.com</a:t>
+            </a:r>
+            <a:r>
+              <a:rPr lang="en-US" sz="2700" dirty="0"/>
+              <a:t>/</a:t>
+            </a:r>
+            <a:r>
+              <a:rPr lang="en-US" sz="2000" dirty="0"/>
+              <a:t>Group6/website/pages/login.php</a:t>
+            </a:r>
+            <a:endParaRPr lang="en-US" sz="2000" dirty="0"/>
           </a:p>
         </p:txBody>
       </p:sp>
@@ -8286,7 +8565,11 @@
           <a:p>
             <a:r>
               <a:rPr lang="en-US" dirty="0" smtClean="0"/>
-              <a:t>Conclusion slide  </a:t>
+              <a:t>API’s are extremely usefu</a:t>
+            </a:r>
+            <a:r>
+              <a:rPr lang="en-US" dirty="0"/>
+              <a:t>l</a:t>
             </a:r>
             <a:endParaRPr lang="en-US" dirty="0"/>
           </a:p>
@@ -9248,11 +9531,11 @@
   <p:clrMapOvr>
     <a:masterClrMapping/>
   </p:clrMapOvr>
-  <mc:AlternateContent xmlns:mc="http://schemas.openxmlformats.org/markup-compatibility/2006">
-    <mc:Choice xmlns:p14="http://schemas.microsoft.com/office/powerpoint/2010/main" Requires="p14">
+  <mc:AlternateContent xmlns:mc="http://schemas.openxmlformats.org/markup-compatibility/2006" xmlns:p14="http://schemas.microsoft.com/office/powerpoint/2010/main">
+    <mc:Choice Requires="p14">
       <p:transition spd="slow" p14:dur="2000"/>
     </mc:Choice>
-    <mc:Fallback>
+    <mc:Fallback xmlns="">
       <p:transition spd="slow"/>
     </mc:Fallback>
   </mc:AlternateContent>
@@ -9417,7 +9700,7 @@
         <p:spPr>
           <a:xfrm>
             <a:off x="433078" y="1524000"/>
-            <a:ext cx="8077199" cy="2634567"/>
+            <a:ext cx="8077199" cy="2939266"/>
           </a:xfrm>
           <a:prstGeom prst="rect">
             <a:avLst/>
@@ -9445,7 +9728,7 @@
               <a:buChar char=""/>
             </a:pPr>
             <a:r>
-              <a:rPr lang="en-US" sz="2200" dirty="0" smtClean="0">
+              <a:rPr lang="en-US" sz="2500" dirty="0" smtClean="0">
                 <a:ln>
                   <a:solidFill>
                     <a:schemeClr val="bg1">
@@ -9485,7 +9768,7 @@
               <a:buChar char=""/>
             </a:pPr>
             <a:r>
-              <a:rPr lang="en-US" sz="2200" dirty="0" smtClean="0">
+              <a:rPr lang="en-US" sz="2500" dirty="0" smtClean="0">
                 <a:ln>
                   <a:solidFill>
                     <a:schemeClr val="bg1">
@@ -9525,7 +9808,7 @@
               <a:buChar char=""/>
             </a:pPr>
             <a:r>
-              <a:rPr lang="en-US" sz="2200" dirty="0" smtClean="0">
+              <a:rPr lang="en-US" sz="2500" dirty="0" smtClean="0">
                 <a:ln>
                   <a:solidFill>
                     <a:schemeClr val="bg1">
@@ -9563,7 +9846,7 @@
               <a:buSzPct val="70000"/>
             </a:pPr>
             <a:r>
-              <a:rPr lang="en-US" sz="2200" dirty="0" smtClean="0">
+              <a:rPr lang="en-US" sz="2500" dirty="0" smtClean="0">
                 <a:ln>
                   <a:solidFill>
                     <a:schemeClr val="bg1">
@@ -9586,7 +9869,7 @@
               </a:rPr>
               <a:t>Output: Employee is notified by a tone/visual </a:t>
             </a:r>
-            <a:endParaRPr lang="en-US" sz="2200" dirty="0">
+            <a:endParaRPr lang="en-US" sz="2500" dirty="0">
               <a:ln>
                 <a:solidFill>
                   <a:schemeClr val="bg1">
@@ -9613,7 +9896,7 @@
               <a:buFont typeface="Arial" panose="020B0604020202020204" pitchFamily="34" charset="0"/>
               <a:buChar char="•"/>
             </a:pPr>
-            <a:endParaRPr lang="en-US" sz="2200" dirty="0"/>
+            <a:endParaRPr lang="en-US" sz="2500" dirty="0"/>
           </a:p>
         </p:txBody>
       </p:sp>
@@ -9971,7 +10254,7 @@
   <a:extraClrSchemeLst/>
   <a:extLst>
     <a:ext uri="{05A4C25C-085E-4340-85A3-A5531E510DB2}">
-      <thm15:themeFamily xmlns:thm15="http://schemas.microsoft.com/office/thememl/2012/main" xmlns="" name="Slate" id="{C3F70B94-7CE9-428E-ADC1-3269CC2C3385}" vid="{3F2DE9A5-64E6-437C-A389-CC4477E817E8}"/>
+      <thm15:themeFamily xmlns:thm15="http://schemas.microsoft.com/office/thememl/2012/main" name="Slate" id="{C3F70B94-7CE9-428E-ADC1-3269CC2C3385}" vid="{3F2DE9A5-64E6-437C-A389-CC4477E817E8}"/>
     </a:ext>
   </a:extLst>
 </a:theme>
@@ -10232,7 +10515,7 @@
   <a:extraClrSchemeLst/>
   <a:extLst>
     <a:ext uri="{05A4C25C-085E-4340-85A3-A5531E510DB2}">
-      <thm15:themeFamily xmlns:thm15="http://schemas.microsoft.com/office/thememl/2012/main" xmlns="" name="Office Theme" id="{62F939B6-93AF-4DB8-9C6B-D6C7DFDC589F}" vid="{4A3C46E8-61CC-4603-A589-7422A47A8E4A}"/>
+      <thm15:themeFamily xmlns:thm15="http://schemas.microsoft.com/office/thememl/2012/main" name="Office Theme" id="{62F939B6-93AF-4DB8-9C6B-D6C7DFDC589F}" vid="{4A3C46E8-61CC-4603-A589-7422A47A8E4A}"/>
     </a:ext>
   </a:extLst>
 </a:theme>

</xml_diff>